<commit_message>
Modify commands for demo and commands slide
</commit_message>
<xml_diff>
--- a/Suplogo.pptx
+++ b/Suplogo.pptx
@@ -209,7 +209,7 @@
           <a:p>
             <a:fld id="{14E4E7EC-0EA8-44C5-8AE2-84A80E56D04E}" type="datetimeFigureOut">
               <a:rPr lang="fr-FR" smtClean="0"/>
-              <a:t>28/06/2017</a:t>
+              <a:t>29/06/2017</a:t>
             </a:fld>
             <a:endParaRPr lang="fr-FR"/>
           </a:p>
@@ -1486,7 +1486,7 @@
           <a:p>
             <a:fld id="{EED3147D-F3CE-40D2-B78F-189808B83622}" type="datetimeFigureOut">
               <a:rPr lang="fr-FR" smtClean="0"/>
-              <a:t>28/06/2017</a:t>
+              <a:t>29/06/2017</a:t>
             </a:fld>
             <a:endParaRPr lang="fr-FR"/>
           </a:p>
@@ -1654,7 +1654,7 @@
           <a:p>
             <a:fld id="{EED3147D-F3CE-40D2-B78F-189808B83622}" type="datetimeFigureOut">
               <a:rPr lang="fr-FR" smtClean="0"/>
-              <a:t>28/06/2017</a:t>
+              <a:t>29/06/2017</a:t>
             </a:fld>
             <a:endParaRPr lang="fr-FR"/>
           </a:p>
@@ -1832,7 +1832,7 @@
           <a:p>
             <a:fld id="{EED3147D-F3CE-40D2-B78F-189808B83622}" type="datetimeFigureOut">
               <a:rPr lang="fr-FR" smtClean="0"/>
-              <a:t>28/06/2017</a:t>
+              <a:t>29/06/2017</a:t>
             </a:fld>
             <a:endParaRPr lang="fr-FR"/>
           </a:p>
@@ -2000,7 +2000,7 @@
           <a:p>
             <a:fld id="{EED3147D-F3CE-40D2-B78F-189808B83622}" type="datetimeFigureOut">
               <a:rPr lang="fr-FR" smtClean="0"/>
-              <a:t>28/06/2017</a:t>
+              <a:t>29/06/2017</a:t>
             </a:fld>
             <a:endParaRPr lang="fr-FR"/>
           </a:p>
@@ -2245,7 +2245,7 @@
           <a:p>
             <a:fld id="{EED3147D-F3CE-40D2-B78F-189808B83622}" type="datetimeFigureOut">
               <a:rPr lang="fr-FR" smtClean="0"/>
-              <a:t>28/06/2017</a:t>
+              <a:t>29/06/2017</a:t>
             </a:fld>
             <a:endParaRPr lang="fr-FR"/>
           </a:p>
@@ -2474,7 +2474,7 @@
           <a:p>
             <a:fld id="{EED3147D-F3CE-40D2-B78F-189808B83622}" type="datetimeFigureOut">
               <a:rPr lang="fr-FR" smtClean="0"/>
-              <a:t>28/06/2017</a:t>
+              <a:t>29/06/2017</a:t>
             </a:fld>
             <a:endParaRPr lang="fr-FR"/>
           </a:p>
@@ -2838,7 +2838,7 @@
           <a:p>
             <a:fld id="{EED3147D-F3CE-40D2-B78F-189808B83622}" type="datetimeFigureOut">
               <a:rPr lang="fr-FR" smtClean="0"/>
-              <a:t>28/06/2017</a:t>
+              <a:t>29/06/2017</a:t>
             </a:fld>
             <a:endParaRPr lang="fr-FR"/>
           </a:p>
@@ -2955,7 +2955,7 @@
           <a:p>
             <a:fld id="{EED3147D-F3CE-40D2-B78F-189808B83622}" type="datetimeFigureOut">
               <a:rPr lang="fr-FR" smtClean="0"/>
-              <a:t>28/06/2017</a:t>
+              <a:t>29/06/2017</a:t>
             </a:fld>
             <a:endParaRPr lang="fr-FR"/>
           </a:p>
@@ -3050,7 +3050,7 @@
           <a:p>
             <a:fld id="{EED3147D-F3CE-40D2-B78F-189808B83622}" type="datetimeFigureOut">
               <a:rPr lang="fr-FR" smtClean="0"/>
-              <a:t>28/06/2017</a:t>
+              <a:t>29/06/2017</a:t>
             </a:fld>
             <a:endParaRPr lang="fr-FR"/>
           </a:p>
@@ -3325,7 +3325,7 @@
           <a:p>
             <a:fld id="{EED3147D-F3CE-40D2-B78F-189808B83622}" type="datetimeFigureOut">
               <a:rPr lang="fr-FR" smtClean="0"/>
-              <a:t>28/06/2017</a:t>
+              <a:t>29/06/2017</a:t>
             </a:fld>
             <a:endParaRPr lang="fr-FR"/>
           </a:p>
@@ -3577,7 +3577,7 @@
           <a:p>
             <a:fld id="{EED3147D-F3CE-40D2-B78F-189808B83622}" type="datetimeFigureOut">
               <a:rPr lang="fr-FR" smtClean="0"/>
-              <a:t>28/06/2017</a:t>
+              <a:t>29/06/2017</a:t>
             </a:fld>
             <a:endParaRPr lang="fr-FR"/>
           </a:p>
@@ -3788,7 +3788,7 @@
           <a:p>
             <a:fld id="{EED3147D-F3CE-40D2-B78F-189808B83622}" type="datetimeFigureOut">
               <a:rPr lang="fr-FR" smtClean="0"/>
-              <a:t>28/06/2017</a:t>
+              <a:t>29/06/2017</a:t>
             </a:fld>
             <a:endParaRPr lang="fr-FR"/>
           </a:p>
@@ -6353,7 +6353,7 @@
       </p:pic>
       <p:pic>
         <p:nvPicPr>
-          <p:cNvPr id="5" name="Image 4"/>
+          <p:cNvPr id="13" name="Image 12"/>
           <p:cNvPicPr>
             <a:picLocks noChangeAspect="1"/>
           </p:cNvPicPr>
@@ -6361,30 +6361,6 @@
         </p:nvPicPr>
         <p:blipFill>
           <a:blip r:embed="rId5"/>
-          <a:stretch>
-            <a:fillRect/>
-          </a:stretch>
-        </p:blipFill>
-        <p:spPr>
-          <a:xfrm>
-            <a:off x="567410" y="3567981"/>
-            <a:ext cx="2717045" cy="2725354"/>
-          </a:xfrm>
-          <a:prstGeom prst="rect">
-            <a:avLst/>
-          </a:prstGeom>
-        </p:spPr>
-      </p:pic>
-      <p:pic>
-        <p:nvPicPr>
-          <p:cNvPr id="13" name="Image 12"/>
-          <p:cNvPicPr>
-            <a:picLocks noChangeAspect="1"/>
-          </p:cNvPicPr>
-          <p:nvPr/>
-        </p:nvPicPr>
-        <p:blipFill>
-          <a:blip r:embed="rId6"/>
           <a:stretch>
             <a:fillRect/>
           </a:stretch>
@@ -6408,7 +6384,7 @@
           <p:nvPr/>
         </p:nvPicPr>
         <p:blipFill>
-          <a:blip r:embed="rId7"/>
+          <a:blip r:embed="rId6"/>
           <a:stretch>
             <a:fillRect/>
           </a:stretch>
@@ -6417,6 +6393,36 @@
           <a:xfrm>
             <a:off x="6409989" y="3864035"/>
             <a:ext cx="2190684" cy="2140130"/>
+          </a:xfrm>
+          <a:prstGeom prst="rect">
+            <a:avLst/>
+          </a:prstGeom>
+        </p:spPr>
+      </p:pic>
+      <p:pic>
+        <p:nvPicPr>
+          <p:cNvPr id="6" name="Image 5"/>
+          <p:cNvPicPr>
+            <a:picLocks noChangeAspect="1"/>
+          </p:cNvPicPr>
+          <p:nvPr/>
+        </p:nvPicPr>
+        <p:blipFill>
+          <a:blip r:embed="rId7">
+            <a:extLst>
+              <a:ext uri="{28A0092B-C50C-407E-A947-70E740481C1C}">
+                <a14:useLocalDpi xmlns:a14="http://schemas.microsoft.com/office/drawing/2010/main" val="0"/>
+              </a:ext>
+            </a:extLst>
+          </a:blip>
+          <a:stretch>
+            <a:fillRect/>
+          </a:stretch>
+        </p:blipFill>
+        <p:spPr>
+          <a:xfrm>
+            <a:off x="566769" y="3567980"/>
+            <a:ext cx="2755772" cy="2725355"/>
           </a:xfrm>
           <a:prstGeom prst="rect">
             <a:avLst/>
@@ -6433,6 +6439,13 @@
   <p:clrMapOvr>
     <a:masterClrMapping/>
   </p:clrMapOvr>
+  <p:timing>
+    <p:tnLst>
+      <p:par>
+        <p:cTn id="1" dur="indefinite" restart="never" nodeType="tmRoot"/>
+      </p:par>
+    </p:tnLst>
+  </p:timing>
 </p:sld>
 </file>
 
@@ -6799,1785 +6812,110 @@
           </a:prstGeom>
         </p:spPr>
       </p:pic>
-      <p:graphicFrame>
-        <p:nvGraphicFramePr>
-          <p:cNvPr id="5" name="Tableau 4"/>
-          <p:cNvGraphicFramePr>
-            <a:graphicFrameLocks noGrp="1"/>
-          </p:cNvGraphicFramePr>
-          <p:nvPr>
-            <p:extLst>
-              <p:ext uri="{D42A27DB-BD31-4B8C-83A1-F6EECF244321}">
-                <p14:modId xmlns:p14="http://schemas.microsoft.com/office/powerpoint/2010/main" val="1593494323"/>
-              </p:ext>
-            </p:extLst>
-          </p:nvPr>
-        </p:nvGraphicFramePr>
-        <p:xfrm>
-          <a:off x="2011575" y="1084081"/>
-          <a:ext cx="8128000" cy="5405120"/>
-        </p:xfrm>
-        <a:graphic>
-          <a:graphicData uri="http://schemas.openxmlformats.org/drawingml/2006/table">
-            <a:tbl>
-              <a:tblPr firstRow="1" bandRow="1">
-                <a:tableStyleId>{5940675A-B579-460E-94D1-54222C63F5DA}</a:tableStyleId>
-              </a:tblPr>
-              <a:tblGrid>
-                <a:gridCol w="4064000">
-                  <a:extLst>
-                    <a:ext uri="{9D8B030D-6E8A-4147-A177-3AD203B41FA5}">
-                      <a16:colId xmlns:a16="http://schemas.microsoft.com/office/drawing/2014/main" xmlns="" val="20000"/>
-                    </a:ext>
-                  </a:extLst>
-                </a:gridCol>
-                <a:gridCol w="4064000">
-                  <a:extLst>
-                    <a:ext uri="{9D8B030D-6E8A-4147-A177-3AD203B41FA5}">
-                      <a16:colId xmlns:a16="http://schemas.microsoft.com/office/drawing/2014/main" xmlns="" val="20001"/>
-                    </a:ext>
-                  </a:extLst>
-                </a:gridCol>
-              </a:tblGrid>
-              <a:tr h="370840">
-                <a:tc>
-                  <a:txBody>
-                    <a:bodyPr/>
-                    <a:lstStyle/>
-                    <a:p>
-                      <a:r>
-                        <a:rPr lang="fr-FR" b="1" dirty="0">
-                          <a:solidFill>
-                            <a:schemeClr val="bg1"/>
-                          </a:solidFill>
-                          <a:effectLst>
-                            <a:outerShdw blurRad="38100" dist="38100" dir="2700000" algn="tl">
-                              <a:srgbClr val="000000">
-                                <a:alpha val="43137"/>
-                              </a:srgbClr>
-                            </a:outerShdw>
-                          </a:effectLst>
-                          <a:latin typeface="Exo 2.0" panose="00000500000000000000"/>
-                        </a:rPr>
-                        <a:t>COMMANDES</a:t>
-                      </a:r>
-                    </a:p>
-                  </a:txBody>
-                  <a:tcPr>
-                    <a:lnL w="12700" cap="flat" cmpd="sng" algn="ctr">
-                      <a:solidFill>
-                        <a:srgbClr val="FF3399"/>
-                      </a:solidFill>
-                      <a:prstDash val="solid"/>
-                      <a:round/>
-                      <a:headEnd type="none" w="med" len="med"/>
-                      <a:tailEnd type="none" w="med" len="med"/>
-                    </a:lnL>
-                    <a:lnR w="12700" cap="flat" cmpd="sng" algn="ctr">
-                      <a:solidFill>
-                        <a:srgbClr val="FF3399"/>
-                      </a:solidFill>
-                      <a:prstDash val="solid"/>
-                      <a:round/>
-                      <a:headEnd type="none" w="med" len="med"/>
-                      <a:tailEnd type="none" w="med" len="med"/>
-                    </a:lnR>
-                    <a:lnT w="12700" cap="flat" cmpd="sng" algn="ctr">
-                      <a:solidFill>
-                        <a:srgbClr val="FF3399"/>
-                      </a:solidFill>
-                      <a:prstDash val="solid"/>
-                      <a:round/>
-                      <a:headEnd type="none" w="med" len="med"/>
-                      <a:tailEnd type="none" w="med" len="med"/>
-                    </a:lnT>
-                    <a:lnB w="12700" cap="flat" cmpd="sng" algn="ctr">
-                      <a:solidFill>
-                        <a:srgbClr val="FF3399"/>
-                      </a:solidFill>
-                      <a:prstDash val="solid"/>
-                      <a:round/>
-                      <a:headEnd type="none" w="med" len="med"/>
-                      <a:tailEnd type="none" w="med" len="med"/>
-                    </a:lnB>
-                    <a:cell3D prstMaterial="dkEdge">
-                      <a:bevel prst="artDeco"/>
-                      <a:lightRig rig="flood" dir="t"/>
-                    </a:cell3D>
-                    <a:solidFill>
-                      <a:srgbClr val="BB1177"/>
-                    </a:solidFill>
-                  </a:tcPr>
-                </a:tc>
-                <a:tc>
-                  <a:txBody>
-                    <a:bodyPr/>
-                    <a:lstStyle/>
-                    <a:p>
-                      <a:r>
-                        <a:rPr lang="fr-FR" b="1" dirty="0">
-                          <a:solidFill>
-                            <a:schemeClr val="bg1"/>
-                          </a:solidFill>
-                          <a:effectLst>
-                            <a:outerShdw blurRad="38100" dist="38100" dir="2700000" algn="tl">
-                              <a:srgbClr val="000000">
-                                <a:alpha val="43137"/>
-                              </a:srgbClr>
-                            </a:outerShdw>
-                          </a:effectLst>
-                          <a:latin typeface="Exo 2.0" panose="00000500000000000000"/>
-                        </a:rPr>
-                        <a:t>EFFETS</a:t>
-                      </a:r>
-                    </a:p>
-                  </a:txBody>
-                  <a:tcPr>
-                    <a:lnL w="12700" cap="flat" cmpd="sng" algn="ctr">
-                      <a:solidFill>
-                        <a:srgbClr val="FF3399"/>
-                      </a:solidFill>
-                      <a:prstDash val="solid"/>
-                      <a:round/>
-                      <a:headEnd type="none" w="med" len="med"/>
-                      <a:tailEnd type="none" w="med" len="med"/>
-                    </a:lnL>
-                    <a:lnR w="12700" cap="flat" cmpd="sng" algn="ctr">
-                      <a:solidFill>
-                        <a:srgbClr val="FF3399"/>
-                      </a:solidFill>
-                      <a:prstDash val="solid"/>
-                      <a:round/>
-                      <a:headEnd type="none" w="med" len="med"/>
-                      <a:tailEnd type="none" w="med" len="med"/>
-                    </a:lnR>
-                    <a:lnT w="12700" cap="flat" cmpd="sng" algn="ctr">
-                      <a:solidFill>
-                        <a:srgbClr val="FF3399"/>
-                      </a:solidFill>
-                      <a:prstDash val="solid"/>
-                      <a:round/>
-                      <a:headEnd type="none" w="med" len="med"/>
-                      <a:tailEnd type="none" w="med" len="med"/>
-                    </a:lnT>
-                    <a:lnB w="12700" cap="flat" cmpd="sng" algn="ctr">
-                      <a:solidFill>
-                        <a:srgbClr val="FF3399"/>
-                      </a:solidFill>
-                      <a:prstDash val="solid"/>
-                      <a:round/>
-                      <a:headEnd type="none" w="med" len="med"/>
-                      <a:tailEnd type="none" w="med" len="med"/>
-                    </a:lnB>
-                    <a:cell3D prstMaterial="dkEdge">
-                      <a:bevel prst="artDeco"/>
-                      <a:lightRig rig="flood" dir="t"/>
-                    </a:cell3D>
-                    <a:solidFill>
-                      <a:srgbClr val="BB1177"/>
-                    </a:solidFill>
-                  </a:tcPr>
-                </a:tc>
-                <a:extLst>
-                  <a:ext uri="{0D108BD9-81ED-4DB2-BD59-A6C34878D82A}">
-                    <a16:rowId xmlns:a16="http://schemas.microsoft.com/office/drawing/2014/main" xmlns="" val="10000"/>
-                  </a:ext>
-                </a:extLst>
-              </a:tr>
-              <a:tr h="370840">
-                <a:tc>
-                  <a:txBody>
-                    <a:bodyPr/>
-                    <a:lstStyle/>
-                    <a:p>
-                      <a:r>
-                        <a:rPr lang="fr-FR" sz="1300" dirty="0">
-                          <a:latin typeface="Exo 2.0" panose="00000500000000000000"/>
-                        </a:rPr>
-                        <a:t>AV </a:t>
-                      </a:r>
-                      <a:r>
-                        <a:rPr lang="fr-FR" sz="1300" i="1" dirty="0">
-                          <a:latin typeface="Exo 2.0" panose="00000500000000000000"/>
-                        </a:rPr>
-                        <a:t>pixels</a:t>
-                      </a:r>
-                      <a:endParaRPr lang="fr-FR" sz="1300" dirty="0">
-                        <a:latin typeface="Exo 2.0" panose="00000500000000000000"/>
-                      </a:endParaRPr>
-                    </a:p>
-                  </a:txBody>
-                  <a:tcPr>
-                    <a:lnL w="12700" cap="flat" cmpd="sng" algn="ctr">
-                      <a:solidFill>
-                        <a:srgbClr val="FF3399"/>
-                      </a:solidFill>
-                      <a:prstDash val="solid"/>
-                      <a:round/>
-                      <a:headEnd type="none" w="med" len="med"/>
-                      <a:tailEnd type="none" w="med" len="med"/>
-                    </a:lnL>
-                    <a:lnR w="12700" cap="flat" cmpd="sng" algn="ctr">
-                      <a:solidFill>
-                        <a:srgbClr val="FF3399"/>
-                      </a:solidFill>
-                      <a:prstDash val="solid"/>
-                      <a:round/>
-                      <a:headEnd type="none" w="med" len="med"/>
-                      <a:tailEnd type="none" w="med" len="med"/>
-                    </a:lnR>
-                    <a:lnT w="12700" cap="flat" cmpd="sng" algn="ctr">
-                      <a:solidFill>
-                        <a:srgbClr val="FF3399"/>
-                      </a:solidFill>
-                      <a:prstDash val="solid"/>
-                      <a:round/>
-                      <a:headEnd type="none" w="med" len="med"/>
-                      <a:tailEnd type="none" w="med" len="med"/>
-                    </a:lnT>
-                    <a:lnB w="12700" cap="flat" cmpd="sng" algn="ctr">
-                      <a:solidFill>
-                        <a:srgbClr val="FF3399"/>
-                      </a:solidFill>
-                      <a:prstDash val="solid"/>
-                      <a:round/>
-                      <a:headEnd type="none" w="med" len="med"/>
-                      <a:tailEnd type="none" w="med" len="med"/>
-                    </a:lnB>
-                    <a:solidFill>
-                      <a:srgbClr val="FFD9F8"/>
-                    </a:solidFill>
-                  </a:tcPr>
-                </a:tc>
-                <a:tc>
-                  <a:txBody>
-                    <a:bodyPr/>
-                    <a:lstStyle/>
-                    <a:p>
-                      <a:r>
-                        <a:rPr lang="fr-FR" sz="1300" dirty="0">
-                          <a:latin typeface="Exo 2.0" panose="00000500000000000000"/>
-                        </a:rPr>
-                        <a:t>La tortue bouge de </a:t>
-                      </a:r>
-                      <a:r>
-                        <a:rPr lang="fr-FR" sz="1300" i="1" dirty="0">
-                          <a:latin typeface="Exo 2.0" panose="00000500000000000000"/>
-                        </a:rPr>
-                        <a:t>pixels</a:t>
-                      </a:r>
-                      <a:r>
-                        <a:rPr lang="fr-FR" sz="1300" i="0" baseline="0" dirty="0">
-                          <a:latin typeface="Exo 2.0" panose="00000500000000000000"/>
-                        </a:rPr>
-                        <a:t> vers l’avant</a:t>
-                      </a:r>
-                      <a:endParaRPr lang="fr-FR" sz="1300" dirty="0">
-                        <a:latin typeface="Exo 2.0" panose="00000500000000000000"/>
-                      </a:endParaRPr>
-                    </a:p>
-                  </a:txBody>
-                  <a:tcPr>
-                    <a:lnL w="12700" cap="flat" cmpd="sng" algn="ctr">
-                      <a:solidFill>
-                        <a:srgbClr val="FF3399"/>
-                      </a:solidFill>
-                      <a:prstDash val="solid"/>
-                      <a:round/>
-                      <a:headEnd type="none" w="med" len="med"/>
-                      <a:tailEnd type="none" w="med" len="med"/>
-                    </a:lnL>
-                    <a:lnR w="12700" cap="flat" cmpd="sng" algn="ctr">
-                      <a:solidFill>
-                        <a:srgbClr val="FF3399"/>
-                      </a:solidFill>
-                      <a:prstDash val="solid"/>
-                      <a:round/>
-                      <a:headEnd type="none" w="med" len="med"/>
-                      <a:tailEnd type="none" w="med" len="med"/>
-                    </a:lnR>
-                    <a:lnT w="12700" cap="flat" cmpd="sng" algn="ctr">
-                      <a:solidFill>
-                        <a:srgbClr val="FF3399"/>
-                      </a:solidFill>
-                      <a:prstDash val="solid"/>
-                      <a:round/>
-                      <a:headEnd type="none" w="med" len="med"/>
-                      <a:tailEnd type="none" w="med" len="med"/>
-                    </a:lnT>
-                    <a:lnB w="12700" cap="flat" cmpd="sng" algn="ctr">
-                      <a:solidFill>
-                        <a:srgbClr val="FF3399"/>
-                      </a:solidFill>
-                      <a:prstDash val="solid"/>
-                      <a:round/>
-                      <a:headEnd type="none" w="med" len="med"/>
-                      <a:tailEnd type="none" w="med" len="med"/>
-                    </a:lnB>
-                    <a:solidFill>
-                      <a:srgbClr val="FFD9F8"/>
-                    </a:solidFill>
-                  </a:tcPr>
-                </a:tc>
-                <a:extLst>
-                  <a:ext uri="{0D108BD9-81ED-4DB2-BD59-A6C34878D82A}">
-                    <a16:rowId xmlns:a16="http://schemas.microsoft.com/office/drawing/2014/main" xmlns="" val="10001"/>
-                  </a:ext>
-                </a:extLst>
-              </a:tr>
-              <a:tr h="370840">
-                <a:tc>
-                  <a:txBody>
-                    <a:bodyPr/>
-                    <a:lstStyle/>
-                    <a:p>
-                      <a:r>
-                        <a:rPr lang="fr-FR" sz="1300" dirty="0">
-                          <a:latin typeface="Exo 2.0" panose="00000500000000000000"/>
-                        </a:rPr>
-                        <a:t>RE </a:t>
-                      </a:r>
-                      <a:r>
-                        <a:rPr lang="fr-FR" sz="1300" i="1" dirty="0">
-                          <a:latin typeface="Exo 2.0" panose="00000500000000000000"/>
-                        </a:rPr>
-                        <a:t>pixels</a:t>
-                      </a:r>
-                      <a:endParaRPr lang="fr-FR" sz="1300" dirty="0">
-                        <a:latin typeface="Exo 2.0" panose="00000500000000000000"/>
-                      </a:endParaRPr>
-                    </a:p>
-                  </a:txBody>
-                  <a:tcPr>
-                    <a:lnL w="12700" cap="flat" cmpd="sng" algn="ctr">
-                      <a:solidFill>
-                        <a:srgbClr val="FF3399"/>
-                      </a:solidFill>
-                      <a:prstDash val="solid"/>
-                      <a:round/>
-                      <a:headEnd type="none" w="med" len="med"/>
-                      <a:tailEnd type="none" w="med" len="med"/>
-                    </a:lnL>
-                    <a:lnR w="12700" cap="flat" cmpd="sng" algn="ctr">
-                      <a:solidFill>
-                        <a:srgbClr val="FF3399"/>
-                      </a:solidFill>
-                      <a:prstDash val="solid"/>
-                      <a:round/>
-                      <a:headEnd type="none" w="med" len="med"/>
-                      <a:tailEnd type="none" w="med" len="med"/>
-                    </a:lnR>
-                    <a:lnT w="12700" cap="flat" cmpd="sng" algn="ctr">
-                      <a:solidFill>
-                        <a:srgbClr val="FF3399"/>
-                      </a:solidFill>
-                      <a:prstDash val="solid"/>
-                      <a:round/>
-                      <a:headEnd type="none" w="med" len="med"/>
-                      <a:tailEnd type="none" w="med" len="med"/>
-                    </a:lnT>
-                    <a:lnB w="12700" cap="flat" cmpd="sng" algn="ctr">
-                      <a:solidFill>
-                        <a:srgbClr val="FF3399"/>
-                      </a:solidFill>
-                      <a:prstDash val="solid"/>
-                      <a:round/>
-                      <a:headEnd type="none" w="med" len="med"/>
-                      <a:tailEnd type="none" w="med" len="med"/>
-                    </a:lnB>
-                    <a:solidFill>
-                      <a:srgbClr val="FFE7FA"/>
-                    </a:solidFill>
-                  </a:tcPr>
-                </a:tc>
-                <a:tc>
-                  <a:txBody>
-                    <a:bodyPr/>
-                    <a:lstStyle/>
-                    <a:p>
-                      <a:r>
-                        <a:rPr lang="fr-FR" sz="1300" dirty="0">
-                          <a:latin typeface="Exo 2.0" panose="00000500000000000000"/>
-                        </a:rPr>
-                        <a:t>La tortue</a:t>
-                      </a:r>
-                      <a:r>
-                        <a:rPr lang="fr-FR" sz="1300" baseline="0" dirty="0">
-                          <a:latin typeface="Exo 2.0" panose="00000500000000000000"/>
-                        </a:rPr>
-                        <a:t> bouge de </a:t>
-                      </a:r>
-                      <a:r>
-                        <a:rPr lang="fr-FR" sz="1300" i="1" baseline="0" dirty="0">
-                          <a:latin typeface="Exo 2.0" panose="00000500000000000000"/>
-                        </a:rPr>
-                        <a:t>pixels</a:t>
-                      </a:r>
-                      <a:r>
-                        <a:rPr lang="fr-FR" sz="1300" i="0" baseline="0" dirty="0">
-                          <a:latin typeface="Exo 2.0" panose="00000500000000000000"/>
-                        </a:rPr>
-                        <a:t> vers l’arrière</a:t>
-                      </a:r>
-                      <a:endParaRPr lang="fr-FR" sz="1300" dirty="0">
-                        <a:latin typeface="Exo 2.0" panose="00000500000000000000"/>
-                      </a:endParaRPr>
-                    </a:p>
-                  </a:txBody>
-                  <a:tcPr>
-                    <a:lnL w="12700" cap="flat" cmpd="sng" algn="ctr">
-                      <a:solidFill>
-                        <a:srgbClr val="FF3399"/>
-                      </a:solidFill>
-                      <a:prstDash val="solid"/>
-                      <a:round/>
-                      <a:headEnd type="none" w="med" len="med"/>
-                      <a:tailEnd type="none" w="med" len="med"/>
-                    </a:lnL>
-                    <a:lnR w="12700" cap="flat" cmpd="sng" algn="ctr">
-                      <a:solidFill>
-                        <a:srgbClr val="FF3399"/>
-                      </a:solidFill>
-                      <a:prstDash val="solid"/>
-                      <a:round/>
-                      <a:headEnd type="none" w="med" len="med"/>
-                      <a:tailEnd type="none" w="med" len="med"/>
-                    </a:lnR>
-                    <a:lnT w="12700" cap="flat" cmpd="sng" algn="ctr">
-                      <a:solidFill>
-                        <a:srgbClr val="FF3399"/>
-                      </a:solidFill>
-                      <a:prstDash val="solid"/>
-                      <a:round/>
-                      <a:headEnd type="none" w="med" len="med"/>
-                      <a:tailEnd type="none" w="med" len="med"/>
-                    </a:lnT>
-                    <a:lnB w="12700" cap="flat" cmpd="sng" algn="ctr">
-                      <a:solidFill>
-                        <a:srgbClr val="FF3399"/>
-                      </a:solidFill>
-                      <a:prstDash val="solid"/>
-                      <a:round/>
-                      <a:headEnd type="none" w="med" len="med"/>
-                      <a:tailEnd type="none" w="med" len="med"/>
-                    </a:lnB>
-                    <a:solidFill>
-                      <a:srgbClr val="FFE7FA"/>
-                    </a:solidFill>
-                  </a:tcPr>
-                </a:tc>
-                <a:extLst>
-                  <a:ext uri="{0D108BD9-81ED-4DB2-BD59-A6C34878D82A}">
-                    <a16:rowId xmlns:a16="http://schemas.microsoft.com/office/drawing/2014/main" xmlns="" val="10002"/>
-                  </a:ext>
-                </a:extLst>
-              </a:tr>
-              <a:tr h="370840">
-                <a:tc>
-                  <a:txBody>
-                    <a:bodyPr/>
-                    <a:lstStyle/>
-                    <a:p>
-                      <a:r>
-                        <a:rPr lang="fr-FR" sz="1300" dirty="0">
-                          <a:latin typeface="Exo 2.0" panose="00000500000000000000"/>
-                        </a:rPr>
-                        <a:t>TD </a:t>
-                      </a:r>
-                      <a:r>
-                        <a:rPr lang="fr-FR" sz="1300" i="1" dirty="0" err="1">
-                          <a:latin typeface="Exo 2.0" panose="00000500000000000000"/>
-                        </a:rPr>
-                        <a:t>degres</a:t>
-                      </a:r>
-                      <a:endParaRPr lang="fr-FR" sz="1300" dirty="0">
-                        <a:latin typeface="Exo 2.0" panose="00000500000000000000"/>
-                      </a:endParaRPr>
-                    </a:p>
-                  </a:txBody>
-                  <a:tcPr>
-                    <a:lnL w="12700" cap="flat" cmpd="sng" algn="ctr">
-                      <a:solidFill>
-                        <a:srgbClr val="FF3399"/>
-                      </a:solidFill>
-                      <a:prstDash val="solid"/>
-                      <a:round/>
-                      <a:headEnd type="none" w="med" len="med"/>
-                      <a:tailEnd type="none" w="med" len="med"/>
-                    </a:lnL>
-                    <a:lnR w="12700" cap="flat" cmpd="sng" algn="ctr">
-                      <a:solidFill>
-                        <a:srgbClr val="FF3399"/>
-                      </a:solidFill>
-                      <a:prstDash val="solid"/>
-                      <a:round/>
-                      <a:headEnd type="none" w="med" len="med"/>
-                      <a:tailEnd type="none" w="med" len="med"/>
-                    </a:lnR>
-                    <a:lnT w="12700" cap="flat" cmpd="sng" algn="ctr">
-                      <a:solidFill>
-                        <a:srgbClr val="FF3399"/>
-                      </a:solidFill>
-                      <a:prstDash val="solid"/>
-                      <a:round/>
-                      <a:headEnd type="none" w="med" len="med"/>
-                      <a:tailEnd type="none" w="med" len="med"/>
-                    </a:lnT>
-                    <a:lnB w="12700" cap="flat" cmpd="sng" algn="ctr">
-                      <a:solidFill>
-                        <a:srgbClr val="FF3399"/>
-                      </a:solidFill>
-                      <a:prstDash val="solid"/>
-                      <a:round/>
-                      <a:headEnd type="none" w="med" len="med"/>
-                      <a:tailEnd type="none" w="med" len="med"/>
-                    </a:lnB>
-                    <a:solidFill>
-                      <a:srgbClr val="FFD9F8"/>
-                    </a:solidFill>
-                  </a:tcPr>
-                </a:tc>
-                <a:tc>
-                  <a:txBody>
-                    <a:bodyPr/>
-                    <a:lstStyle/>
-                    <a:p>
-                      <a:r>
-                        <a:rPr lang="fr-FR" sz="1300" dirty="0">
-                          <a:latin typeface="Exo 2.0" panose="00000500000000000000"/>
-                        </a:rPr>
-                        <a:t>La tortue tourne de </a:t>
-                      </a:r>
-                      <a:r>
-                        <a:rPr lang="fr-FR" sz="1300" i="1" dirty="0">
-                          <a:latin typeface="Exo 2.0" panose="00000500000000000000"/>
-                        </a:rPr>
-                        <a:t>degrés</a:t>
-                      </a:r>
-                      <a:r>
-                        <a:rPr lang="fr-FR" sz="1300" i="0" dirty="0">
-                          <a:latin typeface="Exo 2.0" panose="00000500000000000000"/>
-                        </a:rPr>
-                        <a:t> vers la droite</a:t>
-                      </a:r>
-                      <a:endParaRPr lang="fr-FR" sz="1300" dirty="0">
-                        <a:latin typeface="Exo 2.0" panose="00000500000000000000"/>
-                      </a:endParaRPr>
-                    </a:p>
-                  </a:txBody>
-                  <a:tcPr>
-                    <a:lnL w="12700" cap="flat" cmpd="sng" algn="ctr">
-                      <a:solidFill>
-                        <a:srgbClr val="FF3399"/>
-                      </a:solidFill>
-                      <a:prstDash val="solid"/>
-                      <a:round/>
-                      <a:headEnd type="none" w="med" len="med"/>
-                      <a:tailEnd type="none" w="med" len="med"/>
-                    </a:lnL>
-                    <a:lnR w="12700" cap="flat" cmpd="sng" algn="ctr">
-                      <a:solidFill>
-                        <a:srgbClr val="FF3399"/>
-                      </a:solidFill>
-                      <a:prstDash val="solid"/>
-                      <a:round/>
-                      <a:headEnd type="none" w="med" len="med"/>
-                      <a:tailEnd type="none" w="med" len="med"/>
-                    </a:lnR>
-                    <a:lnT w="12700" cap="flat" cmpd="sng" algn="ctr">
-                      <a:solidFill>
-                        <a:srgbClr val="FF3399"/>
-                      </a:solidFill>
-                      <a:prstDash val="solid"/>
-                      <a:round/>
-                      <a:headEnd type="none" w="med" len="med"/>
-                      <a:tailEnd type="none" w="med" len="med"/>
-                    </a:lnT>
-                    <a:lnB w="12700" cap="flat" cmpd="sng" algn="ctr">
-                      <a:solidFill>
-                        <a:srgbClr val="FF3399"/>
-                      </a:solidFill>
-                      <a:prstDash val="solid"/>
-                      <a:round/>
-                      <a:headEnd type="none" w="med" len="med"/>
-                      <a:tailEnd type="none" w="med" len="med"/>
-                    </a:lnB>
-                    <a:solidFill>
-                      <a:srgbClr val="FFD9F8"/>
-                    </a:solidFill>
-                  </a:tcPr>
-                </a:tc>
-                <a:extLst>
-                  <a:ext uri="{0D108BD9-81ED-4DB2-BD59-A6C34878D82A}">
-                    <a16:rowId xmlns:a16="http://schemas.microsoft.com/office/drawing/2014/main" xmlns="" val="10003"/>
-                  </a:ext>
-                </a:extLst>
-              </a:tr>
-              <a:tr h="370840">
-                <a:tc>
-                  <a:txBody>
-                    <a:bodyPr/>
-                    <a:lstStyle/>
-                    <a:p>
-                      <a:r>
-                        <a:rPr lang="fr-FR" sz="1300" dirty="0">
-                          <a:latin typeface="Exo 2.0" panose="00000500000000000000"/>
-                        </a:rPr>
-                        <a:t>TG </a:t>
-                      </a:r>
-                      <a:r>
-                        <a:rPr lang="fr-FR" sz="1300" i="1" dirty="0" err="1">
-                          <a:latin typeface="Exo 2.0" panose="00000500000000000000"/>
-                        </a:rPr>
-                        <a:t>degres</a:t>
-                      </a:r>
-                      <a:endParaRPr lang="fr-FR" sz="1300" dirty="0">
-                        <a:latin typeface="Exo 2.0" panose="00000500000000000000"/>
-                      </a:endParaRPr>
-                    </a:p>
-                  </a:txBody>
-                  <a:tcPr>
-                    <a:lnL w="12700" cap="flat" cmpd="sng" algn="ctr">
-                      <a:solidFill>
-                        <a:srgbClr val="FF3399"/>
-                      </a:solidFill>
-                      <a:prstDash val="solid"/>
-                      <a:round/>
-                      <a:headEnd type="none" w="med" len="med"/>
-                      <a:tailEnd type="none" w="med" len="med"/>
-                    </a:lnL>
-                    <a:lnR w="12700" cap="flat" cmpd="sng" algn="ctr">
-                      <a:solidFill>
-                        <a:srgbClr val="FF3399"/>
-                      </a:solidFill>
-                      <a:prstDash val="solid"/>
-                      <a:round/>
-                      <a:headEnd type="none" w="med" len="med"/>
-                      <a:tailEnd type="none" w="med" len="med"/>
-                    </a:lnR>
-                    <a:lnT w="12700" cap="flat" cmpd="sng" algn="ctr">
-                      <a:solidFill>
-                        <a:srgbClr val="FF3399"/>
-                      </a:solidFill>
-                      <a:prstDash val="solid"/>
-                      <a:round/>
-                      <a:headEnd type="none" w="med" len="med"/>
-                      <a:tailEnd type="none" w="med" len="med"/>
-                    </a:lnT>
-                    <a:lnB w="12700" cap="flat" cmpd="sng" algn="ctr">
-                      <a:solidFill>
-                        <a:srgbClr val="FF3399"/>
-                      </a:solidFill>
-                      <a:prstDash val="solid"/>
-                      <a:round/>
-                      <a:headEnd type="none" w="med" len="med"/>
-                      <a:tailEnd type="none" w="med" len="med"/>
-                    </a:lnB>
-                    <a:solidFill>
-                      <a:srgbClr val="FFE7FA"/>
-                    </a:solidFill>
-                  </a:tcPr>
-                </a:tc>
-                <a:tc>
-                  <a:txBody>
-                    <a:bodyPr/>
-                    <a:lstStyle/>
-                    <a:p>
-                      <a:r>
-                        <a:rPr lang="fr-FR" sz="1300" dirty="0">
-                          <a:latin typeface="Exo 2.0" panose="00000500000000000000"/>
-                        </a:rPr>
-                        <a:t>La tortue tourne de </a:t>
-                      </a:r>
-                      <a:r>
-                        <a:rPr lang="fr-FR" sz="1300" i="1" dirty="0">
-                          <a:latin typeface="Exo 2.0" panose="00000500000000000000"/>
-                        </a:rPr>
-                        <a:t>degrés</a:t>
-                      </a:r>
-                      <a:r>
-                        <a:rPr lang="fr-FR" sz="1300" i="0" dirty="0">
-                          <a:latin typeface="Exo 2.0" panose="00000500000000000000"/>
-                        </a:rPr>
-                        <a:t> vers la gauche</a:t>
-                      </a:r>
-                      <a:endParaRPr lang="fr-FR" sz="1300" dirty="0">
-                        <a:latin typeface="Exo 2.0" panose="00000500000000000000"/>
-                      </a:endParaRPr>
-                    </a:p>
-                  </a:txBody>
-                  <a:tcPr>
-                    <a:lnL w="12700" cap="flat" cmpd="sng" algn="ctr">
-                      <a:solidFill>
-                        <a:srgbClr val="FF3399"/>
-                      </a:solidFill>
-                      <a:prstDash val="solid"/>
-                      <a:round/>
-                      <a:headEnd type="none" w="med" len="med"/>
-                      <a:tailEnd type="none" w="med" len="med"/>
-                    </a:lnL>
-                    <a:lnR w="12700" cap="flat" cmpd="sng" algn="ctr">
-                      <a:solidFill>
-                        <a:srgbClr val="FF3399"/>
-                      </a:solidFill>
-                      <a:prstDash val="solid"/>
-                      <a:round/>
-                      <a:headEnd type="none" w="med" len="med"/>
-                      <a:tailEnd type="none" w="med" len="med"/>
-                    </a:lnR>
-                    <a:lnT w="12700" cap="flat" cmpd="sng" algn="ctr">
-                      <a:solidFill>
-                        <a:srgbClr val="FF3399"/>
-                      </a:solidFill>
-                      <a:prstDash val="solid"/>
-                      <a:round/>
-                      <a:headEnd type="none" w="med" len="med"/>
-                      <a:tailEnd type="none" w="med" len="med"/>
-                    </a:lnT>
-                    <a:lnB w="12700" cap="flat" cmpd="sng" algn="ctr">
-                      <a:solidFill>
-                        <a:srgbClr val="FF3399"/>
-                      </a:solidFill>
-                      <a:prstDash val="solid"/>
-                      <a:round/>
-                      <a:headEnd type="none" w="med" len="med"/>
-                      <a:tailEnd type="none" w="med" len="med"/>
-                    </a:lnB>
-                    <a:solidFill>
-                      <a:srgbClr val="FFE7FA"/>
-                    </a:solidFill>
-                  </a:tcPr>
-                </a:tc>
-                <a:extLst>
-                  <a:ext uri="{0D108BD9-81ED-4DB2-BD59-A6C34878D82A}">
-                    <a16:rowId xmlns:a16="http://schemas.microsoft.com/office/drawing/2014/main" xmlns="" val="10004"/>
-                  </a:ext>
-                </a:extLst>
-              </a:tr>
-              <a:tr h="370840">
-                <a:tc>
-                  <a:txBody>
-                    <a:bodyPr/>
-                    <a:lstStyle/>
-                    <a:p>
-                      <a:r>
-                        <a:rPr lang="fr-FR" sz="1300" dirty="0">
-                          <a:latin typeface="Exo 2.0" panose="00000500000000000000"/>
-                        </a:rPr>
-                        <a:t>FCC </a:t>
-                      </a:r>
-                      <a:r>
-                        <a:rPr lang="fr-FR" sz="1300" i="1" dirty="0">
-                          <a:latin typeface="Exo 2.0" panose="00000500000000000000"/>
-                        </a:rPr>
-                        <a:t>couleur</a:t>
-                      </a:r>
-                      <a:endParaRPr lang="fr-FR" sz="1300" dirty="0">
-                        <a:latin typeface="Exo 2.0" panose="00000500000000000000"/>
-                      </a:endParaRPr>
-                    </a:p>
-                  </a:txBody>
-                  <a:tcPr>
-                    <a:lnL w="12700" cap="flat" cmpd="sng" algn="ctr">
-                      <a:solidFill>
-                        <a:srgbClr val="FF3399"/>
-                      </a:solidFill>
-                      <a:prstDash val="solid"/>
-                      <a:round/>
-                      <a:headEnd type="none" w="med" len="med"/>
-                      <a:tailEnd type="none" w="med" len="med"/>
-                    </a:lnL>
-                    <a:lnR w="12700" cap="flat" cmpd="sng" algn="ctr">
-                      <a:solidFill>
-                        <a:srgbClr val="FF3399"/>
-                      </a:solidFill>
-                      <a:prstDash val="solid"/>
-                      <a:round/>
-                      <a:headEnd type="none" w="med" len="med"/>
-                      <a:tailEnd type="none" w="med" len="med"/>
-                    </a:lnR>
-                    <a:lnT w="12700" cap="flat" cmpd="sng" algn="ctr">
-                      <a:solidFill>
-                        <a:srgbClr val="FF3399"/>
-                      </a:solidFill>
-                      <a:prstDash val="solid"/>
-                      <a:round/>
-                      <a:headEnd type="none" w="med" len="med"/>
-                      <a:tailEnd type="none" w="med" len="med"/>
-                    </a:lnT>
-                    <a:lnB w="12700" cap="flat" cmpd="sng" algn="ctr">
-                      <a:solidFill>
-                        <a:srgbClr val="FF3399"/>
-                      </a:solidFill>
-                      <a:prstDash val="solid"/>
-                      <a:round/>
-                      <a:headEnd type="none" w="med" len="med"/>
-                      <a:tailEnd type="none" w="med" len="med"/>
-                    </a:lnB>
-                    <a:solidFill>
-                      <a:srgbClr val="FFD9F8"/>
-                    </a:solidFill>
-                  </a:tcPr>
-                </a:tc>
-                <a:tc>
-                  <a:txBody>
-                    <a:bodyPr/>
-                    <a:lstStyle/>
-                    <a:p>
-                      <a:r>
-                        <a:rPr lang="fr-FR" sz="1300" dirty="0">
-                          <a:latin typeface="Exo 2.0" panose="00000500000000000000"/>
-                        </a:rPr>
-                        <a:t>Change</a:t>
-                      </a:r>
-                      <a:r>
-                        <a:rPr lang="fr-FR" sz="1300" baseline="0" dirty="0">
-                          <a:latin typeface="Exo 2.0" panose="00000500000000000000"/>
-                        </a:rPr>
-                        <a:t> la couleur de la tortue en </a:t>
-                      </a:r>
-                      <a:r>
-                        <a:rPr lang="fr-FR" sz="1300" i="1" baseline="0" dirty="0">
-                          <a:latin typeface="Exo 2.0" panose="00000500000000000000"/>
-                        </a:rPr>
-                        <a:t>couleur</a:t>
-                      </a:r>
-                      <a:r>
-                        <a:rPr lang="fr-FR" sz="1300" i="0" baseline="0" dirty="0">
-                          <a:latin typeface="Exo 2.0" panose="00000500000000000000"/>
-                        </a:rPr>
-                        <a:t> au format RVB</a:t>
-                      </a:r>
-                      <a:endParaRPr lang="fr-FR" sz="1300" dirty="0">
-                        <a:latin typeface="Exo 2.0" panose="00000500000000000000"/>
-                      </a:endParaRPr>
-                    </a:p>
-                  </a:txBody>
-                  <a:tcPr>
-                    <a:lnL w="12700" cap="flat" cmpd="sng" algn="ctr">
-                      <a:solidFill>
-                        <a:srgbClr val="FF3399"/>
-                      </a:solidFill>
-                      <a:prstDash val="solid"/>
-                      <a:round/>
-                      <a:headEnd type="none" w="med" len="med"/>
-                      <a:tailEnd type="none" w="med" len="med"/>
-                    </a:lnL>
-                    <a:lnR w="12700" cap="flat" cmpd="sng" algn="ctr">
-                      <a:solidFill>
-                        <a:srgbClr val="FF3399"/>
-                      </a:solidFill>
-                      <a:prstDash val="solid"/>
-                      <a:round/>
-                      <a:headEnd type="none" w="med" len="med"/>
-                      <a:tailEnd type="none" w="med" len="med"/>
-                    </a:lnR>
-                    <a:lnT w="12700" cap="flat" cmpd="sng" algn="ctr">
-                      <a:solidFill>
-                        <a:srgbClr val="FF3399"/>
-                      </a:solidFill>
-                      <a:prstDash val="solid"/>
-                      <a:round/>
-                      <a:headEnd type="none" w="med" len="med"/>
-                      <a:tailEnd type="none" w="med" len="med"/>
-                    </a:lnT>
-                    <a:lnB w="12700" cap="flat" cmpd="sng" algn="ctr">
-                      <a:solidFill>
-                        <a:srgbClr val="FF3399"/>
-                      </a:solidFill>
-                      <a:prstDash val="solid"/>
-                      <a:round/>
-                      <a:headEnd type="none" w="med" len="med"/>
-                      <a:tailEnd type="none" w="med" len="med"/>
-                    </a:lnB>
-                    <a:solidFill>
-                      <a:srgbClr val="FFD9F8"/>
-                    </a:solidFill>
-                  </a:tcPr>
-                </a:tc>
-                <a:extLst>
-                  <a:ext uri="{0D108BD9-81ED-4DB2-BD59-A6C34878D82A}">
-                    <a16:rowId xmlns:a16="http://schemas.microsoft.com/office/drawing/2014/main" xmlns="" val="10005"/>
-                  </a:ext>
-                </a:extLst>
-              </a:tr>
-              <a:tr h="370840">
-                <a:tc>
-                  <a:txBody>
-                    <a:bodyPr/>
-                    <a:lstStyle/>
-                    <a:p>
-                      <a:r>
-                        <a:rPr lang="fr-FR" sz="1300" dirty="0">
-                          <a:latin typeface="Exo 2.0" panose="00000500000000000000"/>
-                        </a:rPr>
-                        <a:t>LC</a:t>
-                      </a:r>
-                    </a:p>
-                  </a:txBody>
-                  <a:tcPr>
-                    <a:lnL w="12700" cap="flat" cmpd="sng" algn="ctr">
-                      <a:solidFill>
-                        <a:srgbClr val="FF3399"/>
-                      </a:solidFill>
-                      <a:prstDash val="solid"/>
-                      <a:round/>
-                      <a:headEnd type="none" w="med" len="med"/>
-                      <a:tailEnd type="none" w="med" len="med"/>
-                    </a:lnL>
-                    <a:lnR w="12700" cap="flat" cmpd="sng" algn="ctr">
-                      <a:solidFill>
-                        <a:srgbClr val="FF3399"/>
-                      </a:solidFill>
-                      <a:prstDash val="solid"/>
-                      <a:round/>
-                      <a:headEnd type="none" w="med" len="med"/>
-                      <a:tailEnd type="none" w="med" len="med"/>
-                    </a:lnR>
-                    <a:lnT w="12700" cap="flat" cmpd="sng" algn="ctr">
-                      <a:solidFill>
-                        <a:srgbClr val="FF3399"/>
-                      </a:solidFill>
-                      <a:prstDash val="solid"/>
-                      <a:round/>
-                      <a:headEnd type="none" w="med" len="med"/>
-                      <a:tailEnd type="none" w="med" len="med"/>
-                    </a:lnT>
-                    <a:lnB w="12700" cap="flat" cmpd="sng" algn="ctr">
-                      <a:solidFill>
-                        <a:srgbClr val="FF3399"/>
-                      </a:solidFill>
-                      <a:prstDash val="solid"/>
-                      <a:round/>
-                      <a:headEnd type="none" w="med" len="med"/>
-                      <a:tailEnd type="none" w="med" len="med"/>
-                    </a:lnB>
-                    <a:solidFill>
-                      <a:srgbClr val="FFE7FA"/>
-                    </a:solidFill>
-                  </a:tcPr>
-                </a:tc>
-                <a:tc>
-                  <a:txBody>
-                    <a:bodyPr/>
-                    <a:lstStyle/>
-                    <a:p>
-                      <a:r>
-                        <a:rPr lang="fr-FR" sz="1300" dirty="0">
-                          <a:latin typeface="Exo 2.0" panose="00000500000000000000"/>
-                        </a:rPr>
-                        <a:t>Le stylo est levé</a:t>
-                      </a:r>
-                    </a:p>
-                  </a:txBody>
-                  <a:tcPr>
-                    <a:lnL w="12700" cap="flat" cmpd="sng" algn="ctr">
-                      <a:solidFill>
-                        <a:srgbClr val="FF3399"/>
-                      </a:solidFill>
-                      <a:prstDash val="solid"/>
-                      <a:round/>
-                      <a:headEnd type="none" w="med" len="med"/>
-                      <a:tailEnd type="none" w="med" len="med"/>
-                    </a:lnL>
-                    <a:lnR w="12700" cap="flat" cmpd="sng" algn="ctr">
-                      <a:solidFill>
-                        <a:srgbClr val="FF3399"/>
-                      </a:solidFill>
-                      <a:prstDash val="solid"/>
-                      <a:round/>
-                      <a:headEnd type="none" w="med" len="med"/>
-                      <a:tailEnd type="none" w="med" len="med"/>
-                    </a:lnR>
-                    <a:lnT w="12700" cap="flat" cmpd="sng" algn="ctr">
-                      <a:solidFill>
-                        <a:srgbClr val="FF3399"/>
-                      </a:solidFill>
-                      <a:prstDash val="solid"/>
-                      <a:round/>
-                      <a:headEnd type="none" w="med" len="med"/>
-                      <a:tailEnd type="none" w="med" len="med"/>
-                    </a:lnT>
-                    <a:lnB w="12700" cap="flat" cmpd="sng" algn="ctr">
-                      <a:solidFill>
-                        <a:srgbClr val="FF3399"/>
-                      </a:solidFill>
-                      <a:prstDash val="solid"/>
-                      <a:round/>
-                      <a:headEnd type="none" w="med" len="med"/>
-                      <a:tailEnd type="none" w="med" len="med"/>
-                    </a:lnB>
-                    <a:solidFill>
-                      <a:srgbClr val="FFE7FA"/>
-                    </a:solidFill>
-                  </a:tcPr>
-                </a:tc>
-                <a:extLst>
-                  <a:ext uri="{0D108BD9-81ED-4DB2-BD59-A6C34878D82A}">
-                    <a16:rowId xmlns:a16="http://schemas.microsoft.com/office/drawing/2014/main" xmlns="" val="10006"/>
-                  </a:ext>
-                </a:extLst>
-              </a:tr>
-              <a:tr h="370840">
-                <a:tc>
-                  <a:txBody>
-                    <a:bodyPr/>
-                    <a:lstStyle/>
-                    <a:p>
-                      <a:r>
-                        <a:rPr lang="fr-FR" sz="1300" dirty="0">
-                          <a:latin typeface="Exo 2.0" panose="00000500000000000000"/>
-                        </a:rPr>
-                        <a:t>BC</a:t>
-                      </a:r>
-                    </a:p>
-                  </a:txBody>
-                  <a:tcPr>
-                    <a:lnL w="12700" cap="flat" cmpd="sng" algn="ctr">
-                      <a:solidFill>
-                        <a:srgbClr val="FF3399"/>
-                      </a:solidFill>
-                      <a:prstDash val="solid"/>
-                      <a:round/>
-                      <a:headEnd type="none" w="med" len="med"/>
-                      <a:tailEnd type="none" w="med" len="med"/>
-                    </a:lnL>
-                    <a:lnR w="12700" cap="flat" cmpd="sng" algn="ctr">
-                      <a:solidFill>
-                        <a:srgbClr val="FF3399"/>
-                      </a:solidFill>
-                      <a:prstDash val="solid"/>
-                      <a:round/>
-                      <a:headEnd type="none" w="med" len="med"/>
-                      <a:tailEnd type="none" w="med" len="med"/>
-                    </a:lnR>
-                    <a:lnT w="12700" cap="flat" cmpd="sng" algn="ctr">
-                      <a:solidFill>
-                        <a:srgbClr val="FF3399"/>
-                      </a:solidFill>
-                      <a:prstDash val="solid"/>
-                      <a:round/>
-                      <a:headEnd type="none" w="med" len="med"/>
-                      <a:tailEnd type="none" w="med" len="med"/>
-                    </a:lnT>
-                    <a:lnB w="12700" cap="flat" cmpd="sng" algn="ctr">
-                      <a:solidFill>
-                        <a:srgbClr val="FF3399"/>
-                      </a:solidFill>
-                      <a:prstDash val="solid"/>
-                      <a:round/>
-                      <a:headEnd type="none" w="med" len="med"/>
-                      <a:tailEnd type="none" w="med" len="med"/>
-                    </a:lnB>
-                    <a:solidFill>
-                      <a:srgbClr val="FFD9F8"/>
-                    </a:solidFill>
-                  </a:tcPr>
-                </a:tc>
-                <a:tc>
-                  <a:txBody>
-                    <a:bodyPr/>
-                    <a:lstStyle/>
-                    <a:p>
-                      <a:r>
-                        <a:rPr lang="fr-FR" sz="1300" dirty="0">
-                          <a:latin typeface="Exo 2.0" panose="00000500000000000000"/>
-                        </a:rPr>
-                        <a:t>Le stylo est baissé</a:t>
-                      </a:r>
-                    </a:p>
-                  </a:txBody>
-                  <a:tcPr>
-                    <a:lnL w="12700" cap="flat" cmpd="sng" algn="ctr">
-                      <a:solidFill>
-                        <a:srgbClr val="FF3399"/>
-                      </a:solidFill>
-                      <a:prstDash val="solid"/>
-                      <a:round/>
-                      <a:headEnd type="none" w="med" len="med"/>
-                      <a:tailEnd type="none" w="med" len="med"/>
-                    </a:lnL>
-                    <a:lnR w="12700" cap="flat" cmpd="sng" algn="ctr">
-                      <a:solidFill>
-                        <a:srgbClr val="FF3399"/>
-                      </a:solidFill>
-                      <a:prstDash val="solid"/>
-                      <a:round/>
-                      <a:headEnd type="none" w="med" len="med"/>
-                      <a:tailEnd type="none" w="med" len="med"/>
-                    </a:lnR>
-                    <a:lnT w="12700" cap="flat" cmpd="sng" algn="ctr">
-                      <a:solidFill>
-                        <a:srgbClr val="FF3399"/>
-                      </a:solidFill>
-                      <a:prstDash val="solid"/>
-                      <a:round/>
-                      <a:headEnd type="none" w="med" len="med"/>
-                      <a:tailEnd type="none" w="med" len="med"/>
-                    </a:lnT>
-                    <a:lnB w="12700" cap="flat" cmpd="sng" algn="ctr">
-                      <a:solidFill>
-                        <a:srgbClr val="FF3399"/>
-                      </a:solidFill>
-                      <a:prstDash val="solid"/>
-                      <a:round/>
-                      <a:headEnd type="none" w="med" len="med"/>
-                      <a:tailEnd type="none" w="med" len="med"/>
-                    </a:lnB>
-                    <a:solidFill>
-                      <a:srgbClr val="FFD9F8"/>
-                    </a:solidFill>
-                  </a:tcPr>
-                </a:tc>
-                <a:extLst>
-                  <a:ext uri="{0D108BD9-81ED-4DB2-BD59-A6C34878D82A}">
-                    <a16:rowId xmlns:a16="http://schemas.microsoft.com/office/drawing/2014/main" xmlns="" val="10007"/>
-                  </a:ext>
-                </a:extLst>
-              </a:tr>
-              <a:tr h="370840">
-                <a:tc>
-                  <a:txBody>
-                    <a:bodyPr/>
-                    <a:lstStyle/>
-                    <a:p>
-                      <a:r>
-                        <a:rPr lang="fr-FR" sz="1300" dirty="0">
-                          <a:latin typeface="Exo 2.0" panose="00000500000000000000"/>
-                        </a:rPr>
-                        <a:t>VE</a:t>
-                      </a:r>
-                    </a:p>
-                  </a:txBody>
-                  <a:tcPr>
-                    <a:lnL w="12700" cap="flat" cmpd="sng" algn="ctr">
-                      <a:solidFill>
-                        <a:srgbClr val="FF3399"/>
-                      </a:solidFill>
-                      <a:prstDash val="solid"/>
-                      <a:round/>
-                      <a:headEnd type="none" w="med" len="med"/>
-                      <a:tailEnd type="none" w="med" len="med"/>
-                    </a:lnL>
-                    <a:lnR w="12700" cap="flat" cmpd="sng" algn="ctr">
-                      <a:solidFill>
-                        <a:srgbClr val="FF3399"/>
-                      </a:solidFill>
-                      <a:prstDash val="solid"/>
-                      <a:round/>
-                      <a:headEnd type="none" w="med" len="med"/>
-                      <a:tailEnd type="none" w="med" len="med"/>
-                    </a:lnR>
-                    <a:lnT w="12700" cap="flat" cmpd="sng" algn="ctr">
-                      <a:solidFill>
-                        <a:srgbClr val="FF3399"/>
-                      </a:solidFill>
-                      <a:prstDash val="solid"/>
-                      <a:round/>
-                      <a:headEnd type="none" w="med" len="med"/>
-                      <a:tailEnd type="none" w="med" len="med"/>
-                    </a:lnT>
-                    <a:lnB w="12700" cap="flat" cmpd="sng" algn="ctr">
-                      <a:solidFill>
-                        <a:srgbClr val="FF3399"/>
-                      </a:solidFill>
-                      <a:prstDash val="solid"/>
-                      <a:round/>
-                      <a:headEnd type="none" w="med" len="med"/>
-                      <a:tailEnd type="none" w="med" len="med"/>
-                    </a:lnB>
-                    <a:solidFill>
-                      <a:srgbClr val="FFE7FA"/>
-                    </a:solidFill>
-                  </a:tcPr>
-                </a:tc>
-                <a:tc>
-                  <a:txBody>
-                    <a:bodyPr/>
-                    <a:lstStyle/>
-                    <a:p>
-                      <a:r>
-                        <a:rPr lang="fr-FR" sz="1300" dirty="0">
-                          <a:latin typeface="Exo 2.0" panose="00000500000000000000"/>
-                        </a:rPr>
-                        <a:t>Efface l’écran et place la tortue au centre orientée vers le haut</a:t>
-                      </a:r>
-                    </a:p>
-                  </a:txBody>
-                  <a:tcPr>
-                    <a:lnL w="12700" cap="flat" cmpd="sng" algn="ctr">
-                      <a:solidFill>
-                        <a:srgbClr val="FF3399"/>
-                      </a:solidFill>
-                      <a:prstDash val="solid"/>
-                      <a:round/>
-                      <a:headEnd type="none" w="med" len="med"/>
-                      <a:tailEnd type="none" w="med" len="med"/>
-                    </a:lnL>
-                    <a:lnR w="12700" cap="flat" cmpd="sng" algn="ctr">
-                      <a:solidFill>
-                        <a:srgbClr val="FF3399"/>
-                      </a:solidFill>
-                      <a:prstDash val="solid"/>
-                      <a:round/>
-                      <a:headEnd type="none" w="med" len="med"/>
-                      <a:tailEnd type="none" w="med" len="med"/>
-                    </a:lnR>
-                    <a:lnT w="12700" cap="flat" cmpd="sng" algn="ctr">
-                      <a:solidFill>
-                        <a:srgbClr val="FF3399"/>
-                      </a:solidFill>
-                      <a:prstDash val="solid"/>
-                      <a:round/>
-                      <a:headEnd type="none" w="med" len="med"/>
-                      <a:tailEnd type="none" w="med" len="med"/>
-                    </a:lnT>
-                    <a:lnB w="12700" cap="flat" cmpd="sng" algn="ctr">
-                      <a:solidFill>
-                        <a:srgbClr val="FF3399"/>
-                      </a:solidFill>
-                      <a:prstDash val="solid"/>
-                      <a:round/>
-                      <a:headEnd type="none" w="med" len="med"/>
-                      <a:tailEnd type="none" w="med" len="med"/>
-                    </a:lnB>
-                    <a:solidFill>
-                      <a:srgbClr val="FFE7FA"/>
-                    </a:solidFill>
-                  </a:tcPr>
-                </a:tc>
-                <a:extLst>
-                  <a:ext uri="{0D108BD9-81ED-4DB2-BD59-A6C34878D82A}">
-                    <a16:rowId xmlns:a16="http://schemas.microsoft.com/office/drawing/2014/main" xmlns="" val="10008"/>
-                  </a:ext>
-                </a:extLst>
-              </a:tr>
-              <a:tr h="370840">
-                <a:tc>
-                  <a:txBody>
-                    <a:bodyPr/>
-                    <a:lstStyle/>
-                    <a:p>
-                      <a:r>
-                        <a:rPr lang="fr-FR" sz="1300" dirty="0">
-                          <a:latin typeface="Exo 2.0" panose="00000500000000000000"/>
-                        </a:rPr>
-                        <a:t>CT</a:t>
-                      </a:r>
-                    </a:p>
-                  </a:txBody>
-                  <a:tcPr>
-                    <a:lnL w="12700" cap="flat" cmpd="sng" algn="ctr">
-                      <a:solidFill>
-                        <a:srgbClr val="FF3399"/>
-                      </a:solidFill>
-                      <a:prstDash val="solid"/>
-                      <a:round/>
-                      <a:headEnd type="none" w="med" len="med"/>
-                      <a:tailEnd type="none" w="med" len="med"/>
-                    </a:lnL>
-                    <a:lnR w="12700" cap="flat" cmpd="sng" algn="ctr">
-                      <a:solidFill>
-                        <a:srgbClr val="FF3399"/>
-                      </a:solidFill>
-                      <a:prstDash val="solid"/>
-                      <a:round/>
-                      <a:headEnd type="none" w="med" len="med"/>
-                      <a:tailEnd type="none" w="med" len="med"/>
-                    </a:lnR>
-                    <a:lnT w="12700" cap="flat" cmpd="sng" algn="ctr">
-                      <a:solidFill>
-                        <a:srgbClr val="FF3399"/>
-                      </a:solidFill>
-                      <a:prstDash val="solid"/>
-                      <a:round/>
-                      <a:headEnd type="none" w="med" len="med"/>
-                      <a:tailEnd type="none" w="med" len="med"/>
-                    </a:lnT>
-                    <a:lnB w="12700" cap="flat" cmpd="sng" algn="ctr">
-                      <a:solidFill>
-                        <a:srgbClr val="FF3399"/>
-                      </a:solidFill>
-                      <a:prstDash val="solid"/>
-                      <a:round/>
-                      <a:headEnd type="none" w="med" len="med"/>
-                      <a:tailEnd type="none" w="med" len="med"/>
-                    </a:lnB>
-                    <a:solidFill>
-                      <a:srgbClr val="FFD9F8"/>
-                    </a:solidFill>
-                  </a:tcPr>
-                </a:tc>
-                <a:tc>
-                  <a:txBody>
-                    <a:bodyPr/>
-                    <a:lstStyle/>
-                    <a:p>
-                      <a:r>
-                        <a:rPr lang="fr-FR" sz="1300" dirty="0">
-                          <a:latin typeface="Exo 2.0" panose="00000500000000000000"/>
-                        </a:rPr>
-                        <a:t>Cache la tortue</a:t>
-                      </a:r>
-                    </a:p>
-                  </a:txBody>
-                  <a:tcPr>
-                    <a:lnL w="12700" cap="flat" cmpd="sng" algn="ctr">
-                      <a:solidFill>
-                        <a:srgbClr val="FF3399"/>
-                      </a:solidFill>
-                      <a:prstDash val="solid"/>
-                      <a:round/>
-                      <a:headEnd type="none" w="med" len="med"/>
-                      <a:tailEnd type="none" w="med" len="med"/>
-                    </a:lnL>
-                    <a:lnR w="12700" cap="flat" cmpd="sng" algn="ctr">
-                      <a:solidFill>
-                        <a:srgbClr val="FF3399"/>
-                      </a:solidFill>
-                      <a:prstDash val="solid"/>
-                      <a:round/>
-                      <a:headEnd type="none" w="med" len="med"/>
-                      <a:tailEnd type="none" w="med" len="med"/>
-                    </a:lnR>
-                    <a:lnT w="12700" cap="flat" cmpd="sng" algn="ctr">
-                      <a:solidFill>
-                        <a:srgbClr val="FF3399"/>
-                      </a:solidFill>
-                      <a:prstDash val="solid"/>
-                      <a:round/>
-                      <a:headEnd type="none" w="med" len="med"/>
-                      <a:tailEnd type="none" w="med" len="med"/>
-                    </a:lnT>
-                    <a:lnB w="12700" cap="flat" cmpd="sng" algn="ctr">
-                      <a:solidFill>
-                        <a:srgbClr val="FF3399"/>
-                      </a:solidFill>
-                      <a:prstDash val="solid"/>
-                      <a:round/>
-                      <a:headEnd type="none" w="med" len="med"/>
-                      <a:tailEnd type="none" w="med" len="med"/>
-                    </a:lnB>
-                    <a:solidFill>
-                      <a:srgbClr val="FFD9F8"/>
-                    </a:solidFill>
-                  </a:tcPr>
-                </a:tc>
-                <a:extLst>
-                  <a:ext uri="{0D108BD9-81ED-4DB2-BD59-A6C34878D82A}">
-                    <a16:rowId xmlns:a16="http://schemas.microsoft.com/office/drawing/2014/main" xmlns="" val="10009"/>
-                  </a:ext>
-                </a:extLst>
-              </a:tr>
-              <a:tr h="370840">
-                <a:tc>
-                  <a:txBody>
-                    <a:bodyPr/>
-                    <a:lstStyle/>
-                    <a:p>
-                      <a:r>
-                        <a:rPr lang="fr-FR" sz="1300" dirty="0">
-                          <a:latin typeface="Exo 2.0" panose="00000500000000000000"/>
-                        </a:rPr>
-                        <a:t>MT</a:t>
-                      </a:r>
-                    </a:p>
-                  </a:txBody>
-                  <a:tcPr>
-                    <a:lnL w="12700" cap="flat" cmpd="sng" algn="ctr">
-                      <a:solidFill>
-                        <a:srgbClr val="FF3399"/>
-                      </a:solidFill>
-                      <a:prstDash val="solid"/>
-                      <a:round/>
-                      <a:headEnd type="none" w="med" len="med"/>
-                      <a:tailEnd type="none" w="med" len="med"/>
-                    </a:lnL>
-                    <a:lnR w="12700" cap="flat" cmpd="sng" algn="ctr">
-                      <a:solidFill>
-                        <a:srgbClr val="FF3399"/>
-                      </a:solidFill>
-                      <a:prstDash val="solid"/>
-                      <a:round/>
-                      <a:headEnd type="none" w="med" len="med"/>
-                      <a:tailEnd type="none" w="med" len="med"/>
-                    </a:lnR>
-                    <a:lnT w="12700" cap="flat" cmpd="sng" algn="ctr">
-                      <a:solidFill>
-                        <a:srgbClr val="FF3399"/>
-                      </a:solidFill>
-                      <a:prstDash val="solid"/>
-                      <a:round/>
-                      <a:headEnd type="none" w="med" len="med"/>
-                      <a:tailEnd type="none" w="med" len="med"/>
-                    </a:lnT>
-                    <a:lnB w="12700" cap="flat" cmpd="sng" algn="ctr">
-                      <a:solidFill>
-                        <a:srgbClr val="FF3399"/>
-                      </a:solidFill>
-                      <a:prstDash val="solid"/>
-                      <a:round/>
-                      <a:headEnd type="none" w="med" len="med"/>
-                      <a:tailEnd type="none" w="med" len="med"/>
-                    </a:lnB>
-                    <a:solidFill>
-                      <a:srgbClr val="FFE7FA"/>
-                    </a:solidFill>
-                  </a:tcPr>
-                </a:tc>
-                <a:tc>
-                  <a:txBody>
-                    <a:bodyPr/>
-                    <a:lstStyle/>
-                    <a:p>
-                      <a:r>
-                        <a:rPr lang="fr-FR" sz="1300" dirty="0">
-                          <a:latin typeface="Exo 2.0" panose="00000500000000000000"/>
-                        </a:rPr>
-                        <a:t>Montre la tortue</a:t>
-                      </a:r>
-                    </a:p>
-                  </a:txBody>
-                  <a:tcPr>
-                    <a:lnL w="12700" cap="flat" cmpd="sng" algn="ctr">
-                      <a:solidFill>
-                        <a:srgbClr val="FF3399"/>
-                      </a:solidFill>
-                      <a:prstDash val="solid"/>
-                      <a:round/>
-                      <a:headEnd type="none" w="med" len="med"/>
-                      <a:tailEnd type="none" w="med" len="med"/>
-                    </a:lnL>
-                    <a:lnR w="12700" cap="flat" cmpd="sng" algn="ctr">
-                      <a:solidFill>
-                        <a:srgbClr val="FF3399"/>
-                      </a:solidFill>
-                      <a:prstDash val="solid"/>
-                      <a:round/>
-                      <a:headEnd type="none" w="med" len="med"/>
-                      <a:tailEnd type="none" w="med" len="med"/>
-                    </a:lnR>
-                    <a:lnT w="12700" cap="flat" cmpd="sng" algn="ctr">
-                      <a:solidFill>
-                        <a:srgbClr val="FF3399"/>
-                      </a:solidFill>
-                      <a:prstDash val="solid"/>
-                      <a:round/>
-                      <a:headEnd type="none" w="med" len="med"/>
-                      <a:tailEnd type="none" w="med" len="med"/>
-                    </a:lnT>
-                    <a:lnB w="12700" cap="flat" cmpd="sng" algn="ctr">
-                      <a:solidFill>
-                        <a:srgbClr val="FF3399"/>
-                      </a:solidFill>
-                      <a:prstDash val="solid"/>
-                      <a:round/>
-                      <a:headEnd type="none" w="med" len="med"/>
-                      <a:tailEnd type="none" w="med" len="med"/>
-                    </a:lnB>
-                    <a:solidFill>
-                      <a:srgbClr val="FFE7FA"/>
-                    </a:solidFill>
-                  </a:tcPr>
-                </a:tc>
-                <a:extLst>
-                  <a:ext uri="{0D108BD9-81ED-4DB2-BD59-A6C34878D82A}">
-                    <a16:rowId xmlns:a16="http://schemas.microsoft.com/office/drawing/2014/main" xmlns="" val="10010"/>
-                  </a:ext>
-                </a:extLst>
-              </a:tr>
-              <a:tr h="370840">
-                <a:tc>
-                  <a:txBody>
-                    <a:bodyPr/>
-                    <a:lstStyle/>
-                    <a:p>
-                      <a:r>
-                        <a:rPr lang="fr-FR" sz="1300" dirty="0">
-                          <a:latin typeface="Exo 2.0" panose="00000500000000000000"/>
-                        </a:rPr>
-                        <a:t>REPETE </a:t>
-                      </a:r>
-                      <a:r>
-                        <a:rPr lang="fr-FR" sz="1300" i="1" dirty="0" err="1">
-                          <a:latin typeface="Exo 2.0" panose="00000500000000000000"/>
-                        </a:rPr>
-                        <a:t>nbr_de_fois</a:t>
-                      </a:r>
-                      <a:r>
-                        <a:rPr lang="fr-FR" sz="1300" i="0" dirty="0">
-                          <a:latin typeface="Exo 2.0" panose="00000500000000000000"/>
-                        </a:rPr>
-                        <a:t> [</a:t>
-                      </a:r>
-                      <a:r>
-                        <a:rPr lang="fr-FR" sz="1300" i="1" dirty="0">
-                          <a:latin typeface="Exo 2.0" panose="00000500000000000000"/>
-                        </a:rPr>
-                        <a:t>commande</a:t>
-                      </a:r>
-                      <a:r>
-                        <a:rPr lang="fr-FR" sz="1300" i="0" dirty="0">
-                          <a:latin typeface="Exo 2.0" panose="00000500000000000000"/>
-                        </a:rPr>
-                        <a:t>]</a:t>
-                      </a:r>
-                      <a:endParaRPr lang="fr-FR" sz="1300" dirty="0">
-                        <a:latin typeface="Exo 2.0" panose="00000500000000000000"/>
-                      </a:endParaRPr>
-                    </a:p>
-                  </a:txBody>
-                  <a:tcPr>
-                    <a:lnL w="12700" cap="flat" cmpd="sng" algn="ctr">
-                      <a:solidFill>
-                        <a:srgbClr val="FF3399"/>
-                      </a:solidFill>
-                      <a:prstDash val="solid"/>
-                      <a:round/>
-                      <a:headEnd type="none" w="med" len="med"/>
-                      <a:tailEnd type="none" w="med" len="med"/>
-                    </a:lnL>
-                    <a:lnR w="12700" cap="flat" cmpd="sng" algn="ctr">
-                      <a:solidFill>
-                        <a:srgbClr val="FF3399"/>
-                      </a:solidFill>
-                      <a:prstDash val="solid"/>
-                      <a:round/>
-                      <a:headEnd type="none" w="med" len="med"/>
-                      <a:tailEnd type="none" w="med" len="med"/>
-                    </a:lnR>
-                    <a:lnT w="12700" cap="flat" cmpd="sng" algn="ctr">
-                      <a:solidFill>
-                        <a:srgbClr val="FF3399"/>
-                      </a:solidFill>
-                      <a:prstDash val="solid"/>
-                      <a:round/>
-                      <a:headEnd type="none" w="med" len="med"/>
-                      <a:tailEnd type="none" w="med" len="med"/>
-                    </a:lnT>
-                    <a:lnB w="12700" cap="flat" cmpd="sng" algn="ctr">
-                      <a:solidFill>
-                        <a:srgbClr val="FF3399"/>
-                      </a:solidFill>
-                      <a:prstDash val="solid"/>
-                      <a:round/>
-                      <a:headEnd type="none" w="med" len="med"/>
-                      <a:tailEnd type="none" w="med" len="med"/>
-                    </a:lnB>
-                    <a:solidFill>
-                      <a:srgbClr val="FFD9F8"/>
-                    </a:solidFill>
-                  </a:tcPr>
-                </a:tc>
-                <a:tc>
-                  <a:txBody>
-                    <a:bodyPr/>
-                    <a:lstStyle/>
-                    <a:p>
-                      <a:r>
-                        <a:rPr lang="fr-FR" sz="1300" dirty="0" err="1">
-                          <a:latin typeface="Exo 2.0" panose="00000500000000000000"/>
-                        </a:rPr>
-                        <a:t>Execute</a:t>
-                      </a:r>
-                      <a:r>
-                        <a:rPr lang="fr-FR" sz="1300" dirty="0">
-                          <a:latin typeface="Exo 2.0" panose="00000500000000000000"/>
-                        </a:rPr>
-                        <a:t> la </a:t>
-                      </a:r>
-                      <a:r>
-                        <a:rPr lang="fr-FR" sz="1300" i="1" dirty="0">
-                          <a:latin typeface="Exo 2.0" panose="00000500000000000000"/>
-                        </a:rPr>
-                        <a:t>commande</a:t>
-                      </a:r>
-                      <a:r>
-                        <a:rPr lang="fr-FR" sz="1300" i="0" dirty="0">
-                          <a:latin typeface="Exo 2.0" panose="00000500000000000000"/>
-                        </a:rPr>
-                        <a:t> un </a:t>
-                      </a:r>
-                      <a:r>
-                        <a:rPr lang="fr-FR" sz="1300" i="1" dirty="0" err="1">
-                          <a:latin typeface="Exo 2.0" panose="00000500000000000000"/>
-                        </a:rPr>
-                        <a:t>nbr_de_fois</a:t>
-                      </a:r>
-                      <a:endParaRPr lang="fr-FR" sz="1300" dirty="0">
-                        <a:latin typeface="Exo 2.0" panose="00000500000000000000"/>
-                      </a:endParaRPr>
-                    </a:p>
-                  </a:txBody>
-                  <a:tcPr>
-                    <a:lnL w="12700" cap="flat" cmpd="sng" algn="ctr">
-                      <a:solidFill>
-                        <a:srgbClr val="FF3399"/>
-                      </a:solidFill>
-                      <a:prstDash val="solid"/>
-                      <a:round/>
-                      <a:headEnd type="none" w="med" len="med"/>
-                      <a:tailEnd type="none" w="med" len="med"/>
-                    </a:lnL>
-                    <a:lnR w="12700" cap="flat" cmpd="sng" algn="ctr">
-                      <a:solidFill>
-                        <a:srgbClr val="FF3399"/>
-                      </a:solidFill>
-                      <a:prstDash val="solid"/>
-                      <a:round/>
-                      <a:headEnd type="none" w="med" len="med"/>
-                      <a:tailEnd type="none" w="med" len="med"/>
-                    </a:lnR>
-                    <a:lnT w="12700" cap="flat" cmpd="sng" algn="ctr">
-                      <a:solidFill>
-                        <a:srgbClr val="FF3399"/>
-                      </a:solidFill>
-                      <a:prstDash val="solid"/>
-                      <a:round/>
-                      <a:headEnd type="none" w="med" len="med"/>
-                      <a:tailEnd type="none" w="med" len="med"/>
-                    </a:lnT>
-                    <a:lnB w="12700" cap="flat" cmpd="sng" algn="ctr">
-                      <a:solidFill>
-                        <a:srgbClr val="FF3399"/>
-                      </a:solidFill>
-                      <a:prstDash val="solid"/>
-                      <a:round/>
-                      <a:headEnd type="none" w="med" len="med"/>
-                      <a:tailEnd type="none" w="med" len="med"/>
-                    </a:lnB>
-                    <a:solidFill>
-                      <a:srgbClr val="FFD9F8"/>
-                    </a:solidFill>
-                  </a:tcPr>
-                </a:tc>
-                <a:extLst>
-                  <a:ext uri="{0D108BD9-81ED-4DB2-BD59-A6C34878D82A}">
-                    <a16:rowId xmlns:a16="http://schemas.microsoft.com/office/drawing/2014/main" xmlns="" val="10011"/>
-                  </a:ext>
-                </a:extLst>
-              </a:tr>
-              <a:tr h="370840">
-                <a:tc>
-                  <a:txBody>
-                    <a:bodyPr/>
-                    <a:lstStyle/>
-                    <a:p>
-                      <a:r>
-                        <a:rPr lang="fr-FR" sz="1300" dirty="0">
-                          <a:latin typeface="Exo 2.0" panose="00000500000000000000"/>
-                        </a:rPr>
-                        <a:t>VI</a:t>
-                      </a:r>
-                    </a:p>
-                  </a:txBody>
-                  <a:tcPr>
-                    <a:lnL w="12700" cap="flat" cmpd="sng" algn="ctr">
-                      <a:solidFill>
-                        <a:srgbClr val="FF3399"/>
-                      </a:solidFill>
-                      <a:prstDash val="solid"/>
-                      <a:round/>
-                      <a:headEnd type="none" w="med" len="med"/>
-                      <a:tailEnd type="none" w="med" len="med"/>
-                    </a:lnL>
-                    <a:lnR w="12700" cap="flat" cmpd="sng" algn="ctr">
-                      <a:solidFill>
-                        <a:srgbClr val="FF3399"/>
-                      </a:solidFill>
-                      <a:prstDash val="solid"/>
-                      <a:round/>
-                      <a:headEnd type="none" w="med" len="med"/>
-                      <a:tailEnd type="none" w="med" len="med"/>
-                    </a:lnR>
-                    <a:lnT w="12700" cap="flat" cmpd="sng" algn="ctr">
-                      <a:solidFill>
-                        <a:srgbClr val="FF3399"/>
-                      </a:solidFill>
-                      <a:prstDash val="solid"/>
-                      <a:round/>
-                      <a:headEnd type="none" w="med" len="med"/>
-                      <a:tailEnd type="none" w="med" len="med"/>
-                    </a:lnT>
-                    <a:lnB w="12700" cap="flat" cmpd="sng" algn="ctr">
-                      <a:solidFill>
-                        <a:srgbClr val="FF3399"/>
-                      </a:solidFill>
-                      <a:prstDash val="solid"/>
-                      <a:round/>
-                      <a:headEnd type="none" w="med" len="med"/>
-                      <a:tailEnd type="none" w="med" len="med"/>
-                    </a:lnB>
-                    <a:solidFill>
-                      <a:srgbClr val="FFE7FA"/>
-                    </a:solidFill>
-                  </a:tcPr>
-                </a:tc>
-                <a:tc>
-                  <a:txBody>
-                    <a:bodyPr/>
-                    <a:lstStyle/>
-                    <a:p>
-                      <a:r>
-                        <a:rPr lang="fr-FR" sz="1300" dirty="0">
-                          <a:latin typeface="Exo 2.0" panose="00000500000000000000"/>
-                        </a:rPr>
-                        <a:t>Gère la vitesse</a:t>
-                      </a:r>
-                    </a:p>
-                  </a:txBody>
-                  <a:tcPr>
-                    <a:lnL w="12700" cap="flat" cmpd="sng" algn="ctr">
-                      <a:solidFill>
-                        <a:srgbClr val="FF3399"/>
-                      </a:solidFill>
-                      <a:prstDash val="solid"/>
-                      <a:round/>
-                      <a:headEnd type="none" w="med" len="med"/>
-                      <a:tailEnd type="none" w="med" len="med"/>
-                    </a:lnL>
-                    <a:lnR w="12700" cap="flat" cmpd="sng" algn="ctr">
-                      <a:solidFill>
-                        <a:srgbClr val="FF3399"/>
-                      </a:solidFill>
-                      <a:prstDash val="solid"/>
-                      <a:round/>
-                      <a:headEnd type="none" w="med" len="med"/>
-                      <a:tailEnd type="none" w="med" len="med"/>
-                    </a:lnR>
-                    <a:lnT w="12700" cap="flat" cmpd="sng" algn="ctr">
-                      <a:solidFill>
-                        <a:srgbClr val="FF3399"/>
-                      </a:solidFill>
-                      <a:prstDash val="solid"/>
-                      <a:round/>
-                      <a:headEnd type="none" w="med" len="med"/>
-                      <a:tailEnd type="none" w="med" len="med"/>
-                    </a:lnT>
-                    <a:lnB w="12700" cap="flat" cmpd="sng" algn="ctr">
-                      <a:solidFill>
-                        <a:srgbClr val="FF3399"/>
-                      </a:solidFill>
-                      <a:prstDash val="solid"/>
-                      <a:round/>
-                      <a:headEnd type="none" w="med" len="med"/>
-                      <a:tailEnd type="none" w="med" len="med"/>
-                    </a:lnB>
-                    <a:solidFill>
-                      <a:srgbClr val="FFE7FA"/>
-                    </a:solidFill>
-                  </a:tcPr>
-                </a:tc>
-                <a:extLst>
-                  <a:ext uri="{0D108BD9-81ED-4DB2-BD59-A6C34878D82A}">
-                    <a16:rowId xmlns:a16="http://schemas.microsoft.com/office/drawing/2014/main" xmlns="" val="10012"/>
-                  </a:ext>
-                </a:extLst>
-              </a:tr>
-            </a:tbl>
-          </a:graphicData>
-        </a:graphic>
-      </p:graphicFrame>
+      <p:pic>
+        <p:nvPicPr>
+          <p:cNvPr id="3" name="Image 2"/>
+          <p:cNvPicPr>
+            <a:picLocks noChangeAspect="1"/>
+          </p:cNvPicPr>
+          <p:nvPr/>
+        </p:nvPicPr>
+        <p:blipFill>
+          <a:blip r:embed="rId4"/>
+          <a:stretch>
+            <a:fillRect/>
+          </a:stretch>
+        </p:blipFill>
+        <p:spPr>
+          <a:xfrm>
+            <a:off x="5489757" y="1805768"/>
+            <a:ext cx="6428558" cy="4116533"/>
+          </a:xfrm>
+          <a:prstGeom prst="rect">
+            <a:avLst/>
+          </a:prstGeom>
+        </p:spPr>
+      </p:pic>
+      <p:sp>
+        <p:nvSpPr>
+          <p:cNvPr id="6" name="ZoneTexte 5"/>
+          <p:cNvSpPr txBox="1"/>
+          <p:nvPr/>
+        </p:nvSpPr>
+        <p:spPr>
+          <a:xfrm>
+            <a:off x="348118" y="2909926"/>
+            <a:ext cx="4704080" cy="1908215"/>
+          </a:xfrm>
+          <a:prstGeom prst="rect">
+            <a:avLst/>
+          </a:prstGeom>
+          <a:noFill/>
+        </p:spPr>
+        <p:txBody>
+          <a:bodyPr wrap="square" rtlCol="0">
+            <a:spAutoFit/>
+          </a:bodyPr>
+          <a:lstStyle/>
+          <a:p>
+            <a:pPr marL="285750" indent="-285750">
+              <a:buFontTx/>
+              <a:buChar char="-"/>
+            </a:pPr>
+            <a:r>
+              <a:rPr lang="fr-FR" sz="2000" dirty="0" smtClean="0">
+                <a:latin typeface="Exo 2" panose="00000500000000000000" pitchFamily="50" charset="0"/>
+              </a:rPr>
+              <a:t>Plusieurs commandes sont disponibles</a:t>
+            </a:r>
+          </a:p>
+          <a:p>
+            <a:pPr marL="285750" indent="-285750">
+              <a:buFontTx/>
+              <a:buChar char="-"/>
+            </a:pPr>
+            <a:endParaRPr lang="fr-FR" dirty="0">
+              <a:latin typeface="Exo 2" panose="00000500000000000000" pitchFamily="50" charset="0"/>
+            </a:endParaRPr>
+          </a:p>
+          <a:p>
+            <a:pPr marL="285750" indent="-285750">
+              <a:buFontTx/>
+              <a:buChar char="-"/>
+            </a:pPr>
+            <a:r>
+              <a:rPr lang="fr-FR" sz="2000" dirty="0" smtClean="0">
+                <a:latin typeface="Exo 2" panose="00000500000000000000" pitchFamily="50" charset="0"/>
+              </a:rPr>
+              <a:t>Ajout de la commande VI</a:t>
+            </a:r>
+          </a:p>
+          <a:p>
+            <a:pPr marL="285750" indent="-285750">
+              <a:buFontTx/>
+              <a:buChar char="-"/>
+            </a:pPr>
+            <a:endParaRPr lang="fr-FR" sz="2000" dirty="0">
+              <a:latin typeface="Exo 2" panose="00000500000000000000" pitchFamily="50" charset="0"/>
+            </a:endParaRPr>
+          </a:p>
+          <a:p>
+            <a:pPr marL="285750" indent="-285750">
+              <a:buFontTx/>
+              <a:buChar char="-"/>
+            </a:pPr>
+            <a:r>
+              <a:rPr lang="fr-FR" sz="2000" dirty="0" smtClean="0">
+                <a:latin typeface="Exo 2" panose="00000500000000000000" pitchFamily="50" charset="0"/>
+              </a:rPr>
+              <a:t>Imbrication de REPETE possible</a:t>
+            </a:r>
+            <a:endParaRPr lang="fr-FR" sz="2000" dirty="0">
+              <a:latin typeface="Exo 2" panose="00000500000000000000" pitchFamily="50" charset="0"/>
+            </a:endParaRPr>
+          </a:p>
+        </p:txBody>
+      </p:sp>
     </p:spTree>
     <p:extLst>
       <p:ext uri="{BB962C8B-B14F-4D97-AF65-F5344CB8AC3E}">
@@ -8588,6 +6926,13 @@
   <p:clrMapOvr>
     <a:masterClrMapping/>
   </p:clrMapOvr>
+  <p:timing>
+    <p:tnLst>
+      <p:par>
+        <p:cTn id="1" dur="indefinite" restart="never" nodeType="tmRoot"/>
+      </p:par>
+    </p:tnLst>
+  </p:timing>
 </p:sld>
 </file>
 
@@ -9001,6 +7346,13 @@
   <p:clrMapOvr>
     <a:masterClrMapping/>
   </p:clrMapOvr>
+  <p:timing>
+    <p:tnLst>
+      <p:par>
+        <p:cTn id="1" dur="indefinite" restart="never" nodeType="tmRoot"/>
+      </p:par>
+    </p:tnLst>
+  </p:timing>
 </p:sld>
 </file>
 
@@ -9942,21 +8294,21 @@
                 <a:gridCol w="369328">
                   <a:extLst>
                     <a:ext uri="{9D8B030D-6E8A-4147-A177-3AD203B41FA5}">
-                      <a16:colId xmlns="" xmlns:a16="http://schemas.microsoft.com/office/drawing/2014/main" val="1734895218"/>
+                      <a16:colId xmlns:a16="http://schemas.microsoft.com/office/drawing/2014/main" xmlns="" val="1734895218"/>
                     </a:ext>
                   </a:extLst>
                 </a:gridCol>
                 <a:gridCol w="5835236">
                   <a:extLst>
                     <a:ext uri="{9D8B030D-6E8A-4147-A177-3AD203B41FA5}">
-                      <a16:colId xmlns="" xmlns:a16="http://schemas.microsoft.com/office/drawing/2014/main" val="908248774"/>
+                      <a16:colId xmlns:a16="http://schemas.microsoft.com/office/drawing/2014/main" xmlns="" val="908248774"/>
                     </a:ext>
                   </a:extLst>
                 </a:gridCol>
                 <a:gridCol w="1923436">
                   <a:extLst>
                     <a:ext uri="{9D8B030D-6E8A-4147-A177-3AD203B41FA5}">
-                      <a16:colId xmlns="" xmlns:a16="http://schemas.microsoft.com/office/drawing/2014/main" val="2529677039"/>
+                      <a16:colId xmlns:a16="http://schemas.microsoft.com/office/drawing/2014/main" xmlns="" val="2529677039"/>
                     </a:ext>
                   </a:extLst>
                 </a:gridCol>
@@ -10047,7 +8399,7 @@
                 </a:tc>
                 <a:extLst>
                   <a:ext uri="{0D108BD9-81ED-4DB2-BD59-A6C34878D82A}">
-                    <a16:rowId xmlns="" xmlns:a16="http://schemas.microsoft.com/office/drawing/2014/main" val="744536208"/>
+                    <a16:rowId xmlns:a16="http://schemas.microsoft.com/office/drawing/2014/main" xmlns="" val="744536208"/>
                   </a:ext>
                 </a:extLst>
               </a:tr>
@@ -10140,7 +8492,7 @@
                 </a:tc>
                 <a:extLst>
                   <a:ext uri="{0D108BD9-81ED-4DB2-BD59-A6C34878D82A}">
-                    <a16:rowId xmlns="" xmlns:a16="http://schemas.microsoft.com/office/drawing/2014/main" val="2523755799"/>
+                    <a16:rowId xmlns:a16="http://schemas.microsoft.com/office/drawing/2014/main" xmlns="" val="2523755799"/>
                   </a:ext>
                 </a:extLst>
               </a:tr>
@@ -10243,7 +8595,7 @@
                 </a:tc>
                 <a:extLst>
                   <a:ext uri="{0D108BD9-81ED-4DB2-BD59-A6C34878D82A}">
-                    <a16:rowId xmlns="" xmlns:a16="http://schemas.microsoft.com/office/drawing/2014/main" val="1214565585"/>
+                    <a16:rowId xmlns:a16="http://schemas.microsoft.com/office/drawing/2014/main" xmlns="" val="1214565585"/>
                   </a:ext>
                 </a:extLst>
               </a:tr>
@@ -10373,19 +8725,7 @@
                           </a:solidFill>
                           <a:latin typeface="+mn-lt"/>
                         </a:rPr>
-                        <a:t>200</a:t>
-                      </a:r>
-                      <a:r>
-                        <a:rPr lang="fr-FR" b="0" dirty="0" smtClean="0">
-                          <a:solidFill>
-                            <a:schemeClr val="tx1">
-                              <a:lumMod val="65000"/>
-                              <a:lumOff val="35000"/>
-                            </a:schemeClr>
-                          </a:solidFill>
-                          <a:latin typeface="+mn-lt"/>
-                        </a:rPr>
-                        <a:t>€</a:t>
+                        <a:t>200€</a:t>
                       </a:r>
                       <a:endParaRPr lang="fr-FR" b="0" dirty="0">
                         <a:solidFill>
@@ -10415,7 +8755,7 @@
                 </a:tc>
                 <a:extLst>
                   <a:ext uri="{0D108BD9-81ED-4DB2-BD59-A6C34878D82A}">
-                    <a16:rowId xmlns="" xmlns:a16="http://schemas.microsoft.com/office/drawing/2014/main" val="1826921360"/>
+                    <a16:rowId xmlns:a16="http://schemas.microsoft.com/office/drawing/2014/main" xmlns="" val="1826921360"/>
                   </a:ext>
                 </a:extLst>
               </a:tr>
@@ -10547,19 +8887,7 @@
                           </a:solidFill>
                           <a:latin typeface="+mn-lt"/>
                         </a:rPr>
-                        <a:t>7000</a:t>
-                      </a:r>
-                      <a:r>
-                        <a:rPr lang="fr-FR" b="0" dirty="0" smtClean="0">
-                          <a:solidFill>
-                            <a:schemeClr val="tx1">
-                              <a:lumMod val="65000"/>
-                              <a:lumOff val="35000"/>
-                            </a:schemeClr>
-                          </a:solidFill>
-                          <a:latin typeface="+mn-lt"/>
-                        </a:rPr>
-                        <a:t>€</a:t>
+                        <a:t>7000€</a:t>
                       </a:r>
                       <a:endParaRPr lang="fr-FR" b="0" dirty="0">
                         <a:solidFill>
@@ -10589,7 +8917,7 @@
                 </a:tc>
                 <a:extLst>
                   <a:ext uri="{0D108BD9-81ED-4DB2-BD59-A6C34878D82A}">
-                    <a16:rowId xmlns="" xmlns:a16="http://schemas.microsoft.com/office/drawing/2014/main" val="2932840409"/>
+                    <a16:rowId xmlns:a16="http://schemas.microsoft.com/office/drawing/2014/main" xmlns="" val="2932840409"/>
                   </a:ext>
                 </a:extLst>
               </a:tr>
@@ -10749,7 +9077,7 @@
                 </a:tc>
                 <a:extLst>
                   <a:ext uri="{0D108BD9-81ED-4DB2-BD59-A6C34878D82A}">
-                    <a16:rowId xmlns="" xmlns:a16="http://schemas.microsoft.com/office/drawing/2014/main" val="3736278046"/>
+                    <a16:rowId xmlns:a16="http://schemas.microsoft.com/office/drawing/2014/main" xmlns="" val="3736278046"/>
                   </a:ext>
                 </a:extLst>
               </a:tr>
@@ -10899,7 +9227,7 @@
                 </a:tc>
                 <a:extLst>
                   <a:ext uri="{0D108BD9-81ED-4DB2-BD59-A6C34878D82A}">
-                    <a16:rowId xmlns="" xmlns:a16="http://schemas.microsoft.com/office/drawing/2014/main" val="2493942223"/>
+                    <a16:rowId xmlns:a16="http://schemas.microsoft.com/office/drawing/2014/main" xmlns="" val="2493942223"/>
                   </a:ext>
                 </a:extLst>
               </a:tr>
@@ -11078,7 +9406,7 @@
                 </a:tc>
                 <a:extLst>
                   <a:ext uri="{0D108BD9-81ED-4DB2-BD59-A6C34878D82A}">
-                    <a16:rowId xmlns="" xmlns:a16="http://schemas.microsoft.com/office/drawing/2014/main" val="3752774149"/>
+                    <a16:rowId xmlns:a16="http://schemas.microsoft.com/office/drawing/2014/main" xmlns="" val="3752774149"/>
                   </a:ext>
                 </a:extLst>
               </a:tr>
@@ -11212,19 +9540,7 @@
                           </a:solidFill>
                           <a:latin typeface="+mn-lt"/>
                         </a:rPr>
-                        <a:t>2500</a:t>
-                      </a:r>
-                      <a:r>
-                        <a:rPr lang="fr-FR" b="0" dirty="0" smtClean="0">
-                          <a:solidFill>
-                            <a:schemeClr val="tx1">
-                              <a:lumMod val="65000"/>
-                              <a:lumOff val="35000"/>
-                            </a:schemeClr>
-                          </a:solidFill>
-                          <a:latin typeface="+mn-lt"/>
-                        </a:rPr>
-                        <a:t>€</a:t>
+                        <a:t>2500€</a:t>
                       </a:r>
                       <a:endParaRPr lang="fr-FR" b="0" dirty="0">
                         <a:solidFill>
@@ -11257,7 +9573,7 @@
                 </a:tc>
                 <a:extLst>
                   <a:ext uri="{0D108BD9-81ED-4DB2-BD59-A6C34878D82A}">
-                    <a16:rowId xmlns="" xmlns:a16="http://schemas.microsoft.com/office/drawing/2014/main" val="3767000208"/>
+                    <a16:rowId xmlns:a16="http://schemas.microsoft.com/office/drawing/2014/main" xmlns="" val="3767000208"/>
                   </a:ext>
                 </a:extLst>
               </a:tr>

</xml_diff>

<commit_message>
Removed animation in pptx
</commit_message>
<xml_diff>
--- a/Suplogo.pptx
+++ b/Suplogo.pptx
@@ -5820,9 +5820,14 @@
   <p:clrMapOvr>
     <a:masterClrMapping/>
   </p:clrMapOvr>
-  <p:transition spd="slow">
-    <p:push dir="u"/>
-  </p:transition>
+  <mc:AlternateContent xmlns:mc="http://schemas.openxmlformats.org/markup-compatibility/2006">
+    <mc:Choice xmlns:p14="http://schemas.microsoft.com/office/powerpoint/2010/main" Requires="p14">
+      <p:transition p14:dur="0"/>
+    </mc:Choice>
+    <mc:Fallback>
+      <p:transition/>
+    </mc:Fallback>
+  </mc:AlternateContent>
 </p:sld>
 </file>
 
@@ -8363,21 +8368,21 @@
                 <a:gridCol w="369328">
                   <a:extLst>
                     <a:ext uri="{9D8B030D-6E8A-4147-A177-3AD203B41FA5}">
-                      <a16:colId xmlns="" xmlns:a16="http://schemas.microsoft.com/office/drawing/2014/main" val="1734895218"/>
+                      <a16:colId xmlns:a16="http://schemas.microsoft.com/office/drawing/2014/main" xmlns="" val="1734895218"/>
                     </a:ext>
                   </a:extLst>
                 </a:gridCol>
                 <a:gridCol w="5835236">
                   <a:extLst>
                     <a:ext uri="{9D8B030D-6E8A-4147-A177-3AD203B41FA5}">
-                      <a16:colId xmlns="" xmlns:a16="http://schemas.microsoft.com/office/drawing/2014/main" val="908248774"/>
+                      <a16:colId xmlns:a16="http://schemas.microsoft.com/office/drawing/2014/main" xmlns="" val="908248774"/>
                     </a:ext>
                   </a:extLst>
                 </a:gridCol>
                 <a:gridCol w="1923436">
                   <a:extLst>
                     <a:ext uri="{9D8B030D-6E8A-4147-A177-3AD203B41FA5}">
-                      <a16:colId xmlns="" xmlns:a16="http://schemas.microsoft.com/office/drawing/2014/main" val="2529677039"/>
+                      <a16:colId xmlns:a16="http://schemas.microsoft.com/office/drawing/2014/main" xmlns="" val="2529677039"/>
                     </a:ext>
                   </a:extLst>
                 </a:gridCol>
@@ -8468,7 +8473,7 @@
                 </a:tc>
                 <a:extLst>
                   <a:ext uri="{0D108BD9-81ED-4DB2-BD59-A6C34878D82A}">
-                    <a16:rowId xmlns="" xmlns:a16="http://schemas.microsoft.com/office/drawing/2014/main" val="744536208"/>
+                    <a16:rowId xmlns:a16="http://schemas.microsoft.com/office/drawing/2014/main" xmlns="" val="744536208"/>
                   </a:ext>
                 </a:extLst>
               </a:tr>
@@ -8561,7 +8566,7 @@
                 </a:tc>
                 <a:extLst>
                   <a:ext uri="{0D108BD9-81ED-4DB2-BD59-A6C34878D82A}">
-                    <a16:rowId xmlns="" xmlns:a16="http://schemas.microsoft.com/office/drawing/2014/main" val="2523755799"/>
+                    <a16:rowId xmlns:a16="http://schemas.microsoft.com/office/drawing/2014/main" xmlns="" val="2523755799"/>
                   </a:ext>
                 </a:extLst>
               </a:tr>
@@ -8664,7 +8669,7 @@
                 </a:tc>
                 <a:extLst>
                   <a:ext uri="{0D108BD9-81ED-4DB2-BD59-A6C34878D82A}">
-                    <a16:rowId xmlns="" xmlns:a16="http://schemas.microsoft.com/office/drawing/2014/main" val="1214565585"/>
+                    <a16:rowId xmlns:a16="http://schemas.microsoft.com/office/drawing/2014/main" xmlns="" val="1214565585"/>
                   </a:ext>
                 </a:extLst>
               </a:tr>
@@ -8824,7 +8829,7 @@
                 </a:tc>
                 <a:extLst>
                   <a:ext uri="{0D108BD9-81ED-4DB2-BD59-A6C34878D82A}">
-                    <a16:rowId xmlns="" xmlns:a16="http://schemas.microsoft.com/office/drawing/2014/main" val="1826921360"/>
+                    <a16:rowId xmlns:a16="http://schemas.microsoft.com/office/drawing/2014/main" xmlns="" val="1826921360"/>
                   </a:ext>
                 </a:extLst>
               </a:tr>
@@ -8986,7 +8991,7 @@
                 </a:tc>
                 <a:extLst>
                   <a:ext uri="{0D108BD9-81ED-4DB2-BD59-A6C34878D82A}">
-                    <a16:rowId xmlns="" xmlns:a16="http://schemas.microsoft.com/office/drawing/2014/main" val="2932840409"/>
+                    <a16:rowId xmlns:a16="http://schemas.microsoft.com/office/drawing/2014/main" xmlns="" val="2932840409"/>
                   </a:ext>
                 </a:extLst>
               </a:tr>
@@ -9146,7 +9151,7 @@
                 </a:tc>
                 <a:extLst>
                   <a:ext uri="{0D108BD9-81ED-4DB2-BD59-A6C34878D82A}">
-                    <a16:rowId xmlns="" xmlns:a16="http://schemas.microsoft.com/office/drawing/2014/main" val="3736278046"/>
+                    <a16:rowId xmlns:a16="http://schemas.microsoft.com/office/drawing/2014/main" xmlns="" val="3736278046"/>
                   </a:ext>
                 </a:extLst>
               </a:tr>
@@ -9296,7 +9301,7 @@
                 </a:tc>
                 <a:extLst>
                   <a:ext uri="{0D108BD9-81ED-4DB2-BD59-A6C34878D82A}">
-                    <a16:rowId xmlns="" xmlns:a16="http://schemas.microsoft.com/office/drawing/2014/main" val="2493942223"/>
+                    <a16:rowId xmlns:a16="http://schemas.microsoft.com/office/drawing/2014/main" xmlns="" val="2493942223"/>
                   </a:ext>
                 </a:extLst>
               </a:tr>
@@ -9475,7 +9480,7 @@
                 </a:tc>
                 <a:extLst>
                   <a:ext uri="{0D108BD9-81ED-4DB2-BD59-A6C34878D82A}">
-                    <a16:rowId xmlns="" xmlns:a16="http://schemas.microsoft.com/office/drawing/2014/main" val="3752774149"/>
+                    <a16:rowId xmlns:a16="http://schemas.microsoft.com/office/drawing/2014/main" xmlns="" val="3752774149"/>
                   </a:ext>
                 </a:extLst>
               </a:tr>
@@ -9642,7 +9647,7 @@
                 </a:tc>
                 <a:extLst>
                   <a:ext uri="{0D108BD9-81ED-4DB2-BD59-A6C34878D82A}">
-                    <a16:rowId xmlns="" xmlns:a16="http://schemas.microsoft.com/office/drawing/2014/main" val="3767000208"/>
+                    <a16:rowId xmlns:a16="http://schemas.microsoft.com/office/drawing/2014/main" xmlns="" val="3767000208"/>
                   </a:ext>
                 </a:extLst>
               </a:tr>

</xml_diff>